<commit_message>
updated legend for contested instead of disputed
</commit_message>
<xml_diff>
--- a/docs/Legend.pptx
+++ b/docs/Legend.pptx
@@ -104,6 +104,11 @@
       </a:defRPr>
     </a:lvl9pPr>
   </p:defaultTextStyle>
+  <p:extLst>
+    <p:ext uri="{EFAFB233-063F-42B5-8137-9DF3F51BA10A}">
+      <p15:sldGuideLst xmlns:p15="http://schemas.microsoft.com/office/powerpoint/2012/main"/>
+    </p:ext>
+  </p:extLst>
 </p:presentation>
 </file>
 
@@ -256,7 +261,7 @@
           <a:p>
             <a:fld id="{AEBBC854-4617-724D-BAB8-DA132ABFC00B}" type="datetimeFigureOut">
               <a:rPr lang="en-US" smtClean="0"/>
-              <a:t>5/11/20</a:t>
+              <a:t>5/16/20</a:t>
             </a:fld>
             <a:endParaRPr lang="en-US"/>
           </a:p>
@@ -456,7 +461,7 @@
           <a:p>
             <a:fld id="{AEBBC854-4617-724D-BAB8-DA132ABFC00B}" type="datetimeFigureOut">
               <a:rPr lang="en-US" smtClean="0"/>
-              <a:t>5/11/20</a:t>
+              <a:t>5/16/20</a:t>
             </a:fld>
             <a:endParaRPr lang="en-US"/>
           </a:p>
@@ -666,7 +671,7 @@
           <a:p>
             <a:fld id="{AEBBC854-4617-724D-BAB8-DA132ABFC00B}" type="datetimeFigureOut">
               <a:rPr lang="en-US" smtClean="0"/>
-              <a:t>5/11/20</a:t>
+              <a:t>5/16/20</a:t>
             </a:fld>
             <a:endParaRPr lang="en-US"/>
           </a:p>
@@ -866,7 +871,7 @@
           <a:p>
             <a:fld id="{AEBBC854-4617-724D-BAB8-DA132ABFC00B}" type="datetimeFigureOut">
               <a:rPr lang="en-US" smtClean="0"/>
-              <a:t>5/11/20</a:t>
+              <a:t>5/16/20</a:t>
             </a:fld>
             <a:endParaRPr lang="en-US"/>
           </a:p>
@@ -1142,7 +1147,7 @@
           <a:p>
             <a:fld id="{AEBBC854-4617-724D-BAB8-DA132ABFC00B}" type="datetimeFigureOut">
               <a:rPr lang="en-US" smtClean="0"/>
-              <a:t>5/11/20</a:t>
+              <a:t>5/16/20</a:t>
             </a:fld>
             <a:endParaRPr lang="en-US"/>
           </a:p>
@@ -1410,7 +1415,7 @@
           <a:p>
             <a:fld id="{AEBBC854-4617-724D-BAB8-DA132ABFC00B}" type="datetimeFigureOut">
               <a:rPr lang="en-US" smtClean="0"/>
-              <a:t>5/11/20</a:t>
+              <a:t>5/16/20</a:t>
             </a:fld>
             <a:endParaRPr lang="en-US"/>
           </a:p>
@@ -1825,7 +1830,7 @@
           <a:p>
             <a:fld id="{AEBBC854-4617-724D-BAB8-DA132ABFC00B}" type="datetimeFigureOut">
               <a:rPr lang="en-US" smtClean="0"/>
-              <a:t>5/11/20</a:t>
+              <a:t>5/16/20</a:t>
             </a:fld>
             <a:endParaRPr lang="en-US"/>
           </a:p>
@@ -1967,7 +1972,7 @@
           <a:p>
             <a:fld id="{AEBBC854-4617-724D-BAB8-DA132ABFC00B}" type="datetimeFigureOut">
               <a:rPr lang="en-US" smtClean="0"/>
-              <a:t>5/11/20</a:t>
+              <a:t>5/16/20</a:t>
             </a:fld>
             <a:endParaRPr lang="en-US"/>
           </a:p>
@@ -2080,7 +2085,7 @@
           <a:p>
             <a:fld id="{AEBBC854-4617-724D-BAB8-DA132ABFC00B}" type="datetimeFigureOut">
               <a:rPr lang="en-US" smtClean="0"/>
-              <a:t>5/11/20</a:t>
+              <a:t>5/16/20</a:t>
             </a:fld>
             <a:endParaRPr lang="en-US"/>
           </a:p>
@@ -2393,7 +2398,7 @@
           <a:p>
             <a:fld id="{AEBBC854-4617-724D-BAB8-DA132ABFC00B}" type="datetimeFigureOut">
               <a:rPr lang="en-US" smtClean="0"/>
-              <a:t>5/11/20</a:t>
+              <a:t>5/16/20</a:t>
             </a:fld>
             <a:endParaRPr lang="en-US"/>
           </a:p>
@@ -2682,7 +2687,7 @@
           <a:p>
             <a:fld id="{AEBBC854-4617-724D-BAB8-DA132ABFC00B}" type="datetimeFigureOut">
               <a:rPr lang="en-US" smtClean="0"/>
-              <a:t>5/11/20</a:t>
+              <a:t>5/16/20</a:t>
             </a:fld>
             <a:endParaRPr lang="en-US"/>
           </a:p>
@@ -2925,7 +2930,7 @@
           <a:p>
             <a:fld id="{AEBBC854-4617-724D-BAB8-DA132ABFC00B}" type="datetimeFigureOut">
               <a:rPr lang="en-US" smtClean="0"/>
-              <a:t>5/11/20</a:t>
+              <a:t>5/16/20</a:t>
             </a:fld>
             <a:endParaRPr lang="en-US"/>
           </a:p>
@@ -3651,7 +3656,7 @@
                 <a:latin typeface="Times New Roman" panose="02020603050405020304" pitchFamily="18" charset="0"/>
                 <a:cs typeface="Times New Roman" panose="02020603050405020304" pitchFamily="18" charset="0"/>
               </a:rPr>
-              <a:t>disputed relationship</a:t>
+              <a:t>contested relationship</a:t>
             </a:r>
           </a:p>
         </p:txBody>
@@ -3737,12 +3742,50 @@
           </a:p>
         </p:txBody>
       </p:sp>
+      <p:sp>
+        <p:nvSpPr>
+          <p:cNvPr id="29" name="Rectangle 28">
+            <a:extLst>
+              <a:ext uri="{FF2B5EF4-FFF2-40B4-BE49-F238E27FC236}">
+                <a16:creationId xmlns:a16="http://schemas.microsoft.com/office/drawing/2014/main" id="{E9C4C8DE-56FE-D74C-AA38-04767D714117}"/>
+              </a:ext>
+            </a:extLst>
+          </p:cNvPr>
+          <p:cNvSpPr/>
+          <p:nvPr/>
+        </p:nvSpPr>
+        <p:spPr>
+          <a:xfrm>
+            <a:off x="4954468" y="2351805"/>
+            <a:ext cx="991281" cy="338554"/>
+          </a:xfrm>
+          <a:prstGeom prst="rect">
+            <a:avLst/>
+          </a:prstGeom>
+        </p:spPr>
+        <p:txBody>
+          <a:bodyPr wrap="square">
+            <a:spAutoFit/>
+          </a:bodyPr>
+          <a:lstStyle/>
+          <a:p>
+            <a:pPr algn="ctr"/>
+            <a:r>
+              <a:rPr lang="en-US" sz="800" b="1" dirty="0">
+                <a:latin typeface="Times New Roman" panose="02020603050405020304" pitchFamily="18" charset="0"/>
+                <a:cs typeface="Times New Roman" panose="02020603050405020304" pitchFamily="18" charset="0"/>
+              </a:rPr>
+              <a:t>Born by parthenogenesis</a:t>
+            </a:r>
+          </a:p>
+        </p:txBody>
+      </p:sp>
       <p:pic>
         <p:nvPicPr>
-          <p:cNvPr id="28" name="Picture 27">
-            <a:extLst>
-              <a:ext uri="{FF2B5EF4-FFF2-40B4-BE49-F238E27FC236}">
-                <a16:creationId xmlns:a16="http://schemas.microsoft.com/office/drawing/2014/main" id="{D6ED8132-9A6D-1F4D-B91C-349A78524B17}"/>
+          <p:cNvPr id="32" name="Picture 31">
+            <a:extLst>
+              <a:ext uri="{FF2B5EF4-FFF2-40B4-BE49-F238E27FC236}">
+                <a16:creationId xmlns:a16="http://schemas.microsoft.com/office/drawing/2014/main" id="{D6EA7A0F-3BEA-B54F-B09E-985C2F5F8190}"/>
               </a:ext>
             </a:extLst>
           </p:cNvPr>
@@ -3753,74 +3796,6 @@
         </p:nvPicPr>
         <p:blipFill>
           <a:blip r:embed="rId2"/>
-          <a:stretch>
-            <a:fillRect/>
-          </a:stretch>
-        </p:blipFill>
-        <p:spPr>
-          <a:xfrm>
-            <a:off x="5319498" y="2004154"/>
-            <a:ext cx="261223" cy="393371"/>
-          </a:xfrm>
-          <a:prstGeom prst="rect">
-            <a:avLst/>
-          </a:prstGeom>
-        </p:spPr>
-      </p:pic>
-      <p:sp>
-        <p:nvSpPr>
-          <p:cNvPr id="29" name="Rectangle 28">
-            <a:extLst>
-              <a:ext uri="{FF2B5EF4-FFF2-40B4-BE49-F238E27FC236}">
-                <a16:creationId xmlns:a16="http://schemas.microsoft.com/office/drawing/2014/main" id="{E9C4C8DE-56FE-D74C-AA38-04767D714117}"/>
-              </a:ext>
-            </a:extLst>
-          </p:cNvPr>
-          <p:cNvSpPr/>
-          <p:nvPr/>
-        </p:nvSpPr>
-        <p:spPr>
-          <a:xfrm>
-            <a:off x="4954468" y="2351805"/>
-            <a:ext cx="991281" cy="338554"/>
-          </a:xfrm>
-          <a:prstGeom prst="rect">
-            <a:avLst/>
-          </a:prstGeom>
-        </p:spPr>
-        <p:txBody>
-          <a:bodyPr wrap="square">
-            <a:spAutoFit/>
-          </a:bodyPr>
-          <a:lstStyle/>
-          <a:p>
-            <a:pPr algn="ctr"/>
-            <a:r>
-              <a:rPr lang="en-US" sz="800" b="1" dirty="0">
-                <a:latin typeface="Times New Roman" panose="02020603050405020304" pitchFamily="18" charset="0"/>
-                <a:cs typeface="Times New Roman" panose="02020603050405020304" pitchFamily="18" charset="0"/>
-              </a:rPr>
-              <a:t>Born by parthenogenesis</a:t>
-            </a:r>
-          </a:p>
-        </p:txBody>
-      </p:sp>
-      <p:pic>
-        <p:nvPicPr>
-          <p:cNvPr id="32" name="Picture 31">
-            <a:extLst>
-              <a:ext uri="{FF2B5EF4-FFF2-40B4-BE49-F238E27FC236}">
-                <a16:creationId xmlns:a16="http://schemas.microsoft.com/office/drawing/2014/main" id="{D6EA7A0F-3BEA-B54F-B09E-985C2F5F8190}"/>
-              </a:ext>
-            </a:extLst>
-          </p:cNvPr>
-          <p:cNvPicPr>
-            <a:picLocks noChangeAspect="1"/>
-          </p:cNvPicPr>
-          <p:nvPr/>
-        </p:nvPicPr>
-        <p:blipFill>
-          <a:blip r:embed="rId3"/>
           <a:stretch>
             <a:fillRect/>
           </a:stretch>
@@ -4183,6 +4158,36 @@
           <p:nvPr/>
         </p:nvPicPr>
         <p:blipFill>
+          <a:blip r:embed="rId3"/>
+          <a:stretch>
+            <a:fillRect/>
+          </a:stretch>
+        </p:blipFill>
+        <p:spPr>
+          <a:xfrm>
+            <a:off x="6838047" y="1958105"/>
+            <a:ext cx="414416" cy="414416"/>
+          </a:xfrm>
+          <a:prstGeom prst="rect">
+            <a:avLst/>
+          </a:prstGeom>
+        </p:spPr>
+      </p:pic>
+      <p:pic>
+        <p:nvPicPr>
+          <p:cNvPr id="67" name="Picture 66">
+            <a:extLst>
+              <a:ext uri="{FF2B5EF4-FFF2-40B4-BE49-F238E27FC236}">
+                <a16:creationId xmlns:a16="http://schemas.microsoft.com/office/drawing/2014/main" id="{FAFD267A-8E50-174D-87AF-5D7217DF5D68}"/>
+              </a:ext>
+            </a:extLst>
+          </p:cNvPr>
+          <p:cNvPicPr>
+            <a:picLocks noChangeAspect="1"/>
+          </p:cNvPicPr>
+          <p:nvPr/>
+        </p:nvPicPr>
+        <p:blipFill>
           <a:blip r:embed="rId4"/>
           <a:stretch>
             <a:fillRect/>
@@ -4190,8 +4195,8 @@
         </p:blipFill>
         <p:spPr>
           <a:xfrm>
-            <a:off x="6838047" y="1958105"/>
-            <a:ext cx="414416" cy="414416"/>
+            <a:off x="5229560" y="1137704"/>
+            <a:ext cx="529200" cy="529200"/>
           </a:xfrm>
           <a:prstGeom prst="rect">
             <a:avLst/>
@@ -4200,10 +4205,10 @@
       </p:pic>
       <p:pic>
         <p:nvPicPr>
-          <p:cNvPr id="67" name="Picture 66">
-            <a:extLst>
-              <a:ext uri="{FF2B5EF4-FFF2-40B4-BE49-F238E27FC236}">
-                <a16:creationId xmlns:a16="http://schemas.microsoft.com/office/drawing/2014/main" id="{FAFD267A-8E50-174D-87AF-5D7217DF5D68}"/>
+          <p:cNvPr id="68" name="Picture 67">
+            <a:extLst>
+              <a:ext uri="{FF2B5EF4-FFF2-40B4-BE49-F238E27FC236}">
+                <a16:creationId xmlns:a16="http://schemas.microsoft.com/office/drawing/2014/main" id="{991503AA-12A7-334D-A043-A41F82BAD9A2}"/>
               </a:ext>
             </a:extLst>
           </p:cNvPr>
@@ -4220,20 +4225,134 @@
         </p:blipFill>
         <p:spPr>
           <a:xfrm>
-            <a:off x="5229560" y="1137704"/>
-            <a:ext cx="529200" cy="529200"/>
+            <a:off x="6023847" y="1924416"/>
+            <a:ext cx="494153" cy="494153"/>
           </a:xfrm>
           <a:prstGeom prst="rect">
             <a:avLst/>
           </a:prstGeom>
         </p:spPr>
       </p:pic>
+      <p:sp>
+        <p:nvSpPr>
+          <p:cNvPr id="69" name="Rectangle 68">
+            <a:extLst>
+              <a:ext uri="{FF2B5EF4-FFF2-40B4-BE49-F238E27FC236}">
+                <a16:creationId xmlns:a16="http://schemas.microsoft.com/office/drawing/2014/main" id="{846DE241-E5E1-9443-B28D-7F95688B6460}"/>
+              </a:ext>
+            </a:extLst>
+          </p:cNvPr>
+          <p:cNvSpPr/>
+          <p:nvPr/>
+        </p:nvSpPr>
+        <p:spPr>
+          <a:xfrm>
+            <a:off x="6658020" y="2351805"/>
+            <a:ext cx="727124" cy="338554"/>
+          </a:xfrm>
+          <a:prstGeom prst="rect">
+            <a:avLst/>
+          </a:prstGeom>
+        </p:spPr>
+        <p:txBody>
+          <a:bodyPr wrap="square">
+            <a:spAutoFit/>
+          </a:bodyPr>
+          <a:lstStyle/>
+          <a:p>
+            <a:pPr algn="ctr"/>
+            <a:r>
+              <a:rPr lang="en-US" sz="800" b="1" dirty="0">
+                <a:latin typeface="Times New Roman" panose="02020603050405020304" pitchFamily="18" charset="0"/>
+                <a:cs typeface="Times New Roman" panose="02020603050405020304" pitchFamily="18" charset="0"/>
+              </a:rPr>
+              <a:t>Created by an agent</a:t>
+            </a:r>
+          </a:p>
+        </p:txBody>
+      </p:sp>
+      <p:sp>
+        <p:nvSpPr>
+          <p:cNvPr id="72" name="Rectangle 71">
+            <a:extLst>
+              <a:ext uri="{FF2B5EF4-FFF2-40B4-BE49-F238E27FC236}">
+                <a16:creationId xmlns:a16="http://schemas.microsoft.com/office/drawing/2014/main" id="{48464DB8-23EB-804B-9D34-4A64F80CC17B}"/>
+              </a:ext>
+            </a:extLst>
+          </p:cNvPr>
+          <p:cNvSpPr/>
+          <p:nvPr/>
+        </p:nvSpPr>
+        <p:spPr>
+          <a:xfrm>
+            <a:off x="3698966" y="1875963"/>
+            <a:ext cx="620683" cy="215444"/>
+          </a:xfrm>
+          <a:prstGeom prst="rect">
+            <a:avLst/>
+          </a:prstGeom>
+        </p:spPr>
+        <p:txBody>
+          <a:bodyPr wrap="none">
+            <a:spAutoFit/>
+          </a:bodyPr>
+          <a:lstStyle/>
+          <a:p>
+            <a:pPr algn="ctr"/>
+            <a:r>
+              <a:rPr lang="en-US" sz="800" dirty="0">
+                <a:latin typeface="Times New Roman" panose="02020603050405020304" pitchFamily="18" charset="0"/>
+                <a:cs typeface="Times New Roman" panose="02020603050405020304" pitchFamily="18" charset="0"/>
+              </a:rPr>
+              <a:t>(clickable)</a:t>
+            </a:r>
+          </a:p>
+        </p:txBody>
+      </p:sp>
+      <p:sp>
+        <p:nvSpPr>
+          <p:cNvPr id="73" name="Rectangle 72">
+            <a:extLst>
+              <a:ext uri="{FF2B5EF4-FFF2-40B4-BE49-F238E27FC236}">
+                <a16:creationId xmlns:a16="http://schemas.microsoft.com/office/drawing/2014/main" id="{8DB90419-7D9E-2D41-94E9-5E9FD76AEE45}"/>
+              </a:ext>
+            </a:extLst>
+          </p:cNvPr>
+          <p:cNvSpPr/>
+          <p:nvPr/>
+        </p:nvSpPr>
+        <p:spPr>
+          <a:xfrm>
+            <a:off x="3698966" y="2397525"/>
+            <a:ext cx="620683" cy="215444"/>
+          </a:xfrm>
+          <a:prstGeom prst="rect">
+            <a:avLst/>
+          </a:prstGeom>
+        </p:spPr>
+        <p:txBody>
+          <a:bodyPr wrap="none">
+            <a:spAutoFit/>
+          </a:bodyPr>
+          <a:lstStyle/>
+          <a:p>
+            <a:pPr algn="ctr"/>
+            <a:r>
+              <a:rPr lang="en-US" sz="800" dirty="0">
+                <a:latin typeface="Times New Roman" panose="02020603050405020304" pitchFamily="18" charset="0"/>
+                <a:cs typeface="Times New Roman" panose="02020603050405020304" pitchFamily="18" charset="0"/>
+              </a:rPr>
+              <a:t>(clickable)</a:t>
+            </a:r>
+          </a:p>
+        </p:txBody>
+      </p:sp>
       <p:pic>
         <p:nvPicPr>
-          <p:cNvPr id="68" name="Picture 67">
-            <a:extLst>
-              <a:ext uri="{FF2B5EF4-FFF2-40B4-BE49-F238E27FC236}">
-                <a16:creationId xmlns:a16="http://schemas.microsoft.com/office/drawing/2014/main" id="{991503AA-12A7-334D-A043-A41F82BAD9A2}"/>
+          <p:cNvPr id="4" name="Picture 3">
+            <a:extLst>
+              <a:ext uri="{FF2B5EF4-FFF2-40B4-BE49-F238E27FC236}">
+                <a16:creationId xmlns:a16="http://schemas.microsoft.com/office/drawing/2014/main" id="{DBDA7297-6435-EB46-B5FC-CA94184791B8}"/>
               </a:ext>
             </a:extLst>
           </p:cNvPr>
@@ -4250,128 +4369,14 @@
         </p:blipFill>
         <p:spPr>
           <a:xfrm>
-            <a:off x="6023847" y="1924416"/>
-            <a:ext cx="494153" cy="494153"/>
+            <a:off x="5344527" y="1993856"/>
+            <a:ext cx="239564" cy="378665"/>
           </a:xfrm>
           <a:prstGeom prst="rect">
             <a:avLst/>
           </a:prstGeom>
         </p:spPr>
       </p:pic>
-      <p:sp>
-        <p:nvSpPr>
-          <p:cNvPr id="69" name="Rectangle 68">
-            <a:extLst>
-              <a:ext uri="{FF2B5EF4-FFF2-40B4-BE49-F238E27FC236}">
-                <a16:creationId xmlns:a16="http://schemas.microsoft.com/office/drawing/2014/main" id="{846DE241-E5E1-9443-B28D-7F95688B6460}"/>
-              </a:ext>
-            </a:extLst>
-          </p:cNvPr>
-          <p:cNvSpPr/>
-          <p:nvPr/>
-        </p:nvSpPr>
-        <p:spPr>
-          <a:xfrm>
-            <a:off x="6658020" y="2351805"/>
-            <a:ext cx="727124" cy="338554"/>
-          </a:xfrm>
-          <a:prstGeom prst="rect">
-            <a:avLst/>
-          </a:prstGeom>
-        </p:spPr>
-        <p:txBody>
-          <a:bodyPr wrap="square">
-            <a:spAutoFit/>
-          </a:bodyPr>
-          <a:lstStyle/>
-          <a:p>
-            <a:pPr algn="ctr"/>
-            <a:r>
-              <a:rPr lang="en-US" sz="800" b="1" dirty="0">
-                <a:latin typeface="Times New Roman" panose="02020603050405020304" pitchFamily="18" charset="0"/>
-                <a:cs typeface="Times New Roman" panose="02020603050405020304" pitchFamily="18" charset="0"/>
-              </a:rPr>
-              <a:t>Created by an agent</a:t>
-            </a:r>
-          </a:p>
-        </p:txBody>
-      </p:sp>
-      <p:sp>
-        <p:nvSpPr>
-          <p:cNvPr id="72" name="Rectangle 71">
-            <a:extLst>
-              <a:ext uri="{FF2B5EF4-FFF2-40B4-BE49-F238E27FC236}">
-                <a16:creationId xmlns:a16="http://schemas.microsoft.com/office/drawing/2014/main" id="{48464DB8-23EB-804B-9D34-4A64F80CC17B}"/>
-              </a:ext>
-            </a:extLst>
-          </p:cNvPr>
-          <p:cNvSpPr/>
-          <p:nvPr/>
-        </p:nvSpPr>
-        <p:spPr>
-          <a:xfrm>
-            <a:off x="3698966" y="1875963"/>
-            <a:ext cx="620683" cy="215444"/>
-          </a:xfrm>
-          <a:prstGeom prst="rect">
-            <a:avLst/>
-          </a:prstGeom>
-        </p:spPr>
-        <p:txBody>
-          <a:bodyPr wrap="none">
-            <a:spAutoFit/>
-          </a:bodyPr>
-          <a:lstStyle/>
-          <a:p>
-            <a:pPr algn="ctr"/>
-            <a:r>
-              <a:rPr lang="en-US" sz="800" dirty="0">
-                <a:latin typeface="Times New Roman" panose="02020603050405020304" pitchFamily="18" charset="0"/>
-                <a:cs typeface="Times New Roman" panose="02020603050405020304" pitchFamily="18" charset="0"/>
-              </a:rPr>
-              <a:t>(clickable)</a:t>
-            </a:r>
-          </a:p>
-        </p:txBody>
-      </p:sp>
-      <p:sp>
-        <p:nvSpPr>
-          <p:cNvPr id="73" name="Rectangle 72">
-            <a:extLst>
-              <a:ext uri="{FF2B5EF4-FFF2-40B4-BE49-F238E27FC236}">
-                <a16:creationId xmlns:a16="http://schemas.microsoft.com/office/drawing/2014/main" id="{8DB90419-7D9E-2D41-94E9-5E9FD76AEE45}"/>
-              </a:ext>
-            </a:extLst>
-          </p:cNvPr>
-          <p:cNvSpPr/>
-          <p:nvPr/>
-        </p:nvSpPr>
-        <p:spPr>
-          <a:xfrm>
-            <a:off x="3698966" y="2397525"/>
-            <a:ext cx="620683" cy="215444"/>
-          </a:xfrm>
-          <a:prstGeom prst="rect">
-            <a:avLst/>
-          </a:prstGeom>
-        </p:spPr>
-        <p:txBody>
-          <a:bodyPr wrap="none">
-            <a:spAutoFit/>
-          </a:bodyPr>
-          <a:lstStyle/>
-          <a:p>
-            <a:pPr algn="ctr"/>
-            <a:r>
-              <a:rPr lang="en-US" sz="800" dirty="0">
-                <a:latin typeface="Times New Roman" panose="02020603050405020304" pitchFamily="18" charset="0"/>
-                <a:cs typeface="Times New Roman" panose="02020603050405020304" pitchFamily="18" charset="0"/>
-              </a:rPr>
-              <a:t>(clickable)</a:t>
-            </a:r>
-          </a:p>
-        </p:txBody>
-      </p:sp>
     </p:spTree>
     <p:extLst>
       <p:ext uri="{BB962C8B-B14F-4D97-AF65-F5344CB8AC3E}">

</xml_diff>

<commit_message>
Changed scaife viewer link to english
</commit_message>
<xml_diff>
--- a/docs/Legend.pptx
+++ b/docs/Legend.pptx
@@ -3357,1026 +3357,1047 @@
           <a:chExt cx="0" cy="0"/>
         </a:xfrm>
       </p:grpSpPr>
-      <p:sp>
-        <p:nvSpPr>
-          <p:cNvPr id="5" name="TextBox 4">
-            <a:extLst>
-              <a:ext uri="{FF2B5EF4-FFF2-40B4-BE49-F238E27FC236}">
-                <a16:creationId xmlns:a16="http://schemas.microsoft.com/office/drawing/2014/main" id="{75CA0B2C-3058-E44D-9081-87280518A818}"/>
-              </a:ext>
-            </a:extLst>
-          </p:cNvPr>
-          <p:cNvSpPr txBox="1"/>
+      <p:grpSp>
+        <p:nvGrpSpPr>
+          <p:cNvPr id="8" name="Group 7">
+            <a:extLst>
+              <a:ext uri="{FF2B5EF4-FFF2-40B4-BE49-F238E27FC236}">
+                <a16:creationId xmlns:a16="http://schemas.microsoft.com/office/drawing/2014/main" id="{CC3CD8AE-7967-234A-8EE7-F0CF6A6B0716}"/>
+              </a:ext>
+            </a:extLst>
+          </p:cNvPr>
+          <p:cNvGrpSpPr/>
           <p:nvPr/>
-        </p:nvSpPr>
-        <p:spPr>
+        </p:nvGrpSpPr>
+        <p:grpSpPr>
           <a:xfrm>
-            <a:off x="1937657" y="1164767"/>
-            <a:ext cx="991281" cy="400110"/>
+            <a:off x="1937656" y="1137704"/>
+            <a:ext cx="5525162" cy="1552655"/>
+            <a:chOff x="1937656" y="1137704"/>
+            <a:chExt cx="5525162" cy="1552655"/>
           </a:xfrm>
-          <a:prstGeom prst="rect">
-            <a:avLst/>
-          </a:prstGeom>
-          <a:noFill/>
-          <a:ln w="25400">
-            <a:solidFill>
+        </p:grpSpPr>
+        <p:sp>
+          <p:nvSpPr>
+            <p:cNvPr id="5" name="TextBox 4">
+              <a:extLst>
+                <a:ext uri="{FF2B5EF4-FFF2-40B4-BE49-F238E27FC236}">
+                  <a16:creationId xmlns:a16="http://schemas.microsoft.com/office/drawing/2014/main" id="{75CA0B2C-3058-E44D-9081-87280518A818}"/>
+                </a:ext>
+              </a:extLst>
+            </p:cNvPr>
+            <p:cNvSpPr txBox="1"/>
+            <p:nvPr/>
+          </p:nvSpPr>
+          <p:spPr>
+            <a:xfrm>
+              <a:off x="1937657" y="1164767"/>
+              <a:ext cx="991281" cy="400110"/>
+            </a:xfrm>
+            <a:prstGeom prst="rect">
+              <a:avLst/>
+            </a:prstGeom>
+            <a:noFill/>
+            <a:ln w="25400">
+              <a:solidFill>
+                <a:schemeClr val="tx1"/>
+              </a:solidFill>
+            </a:ln>
+          </p:spPr>
+          <p:txBody>
+            <a:bodyPr wrap="square" rtlCol="0">
+              <a:spAutoFit/>
+            </a:bodyPr>
+            <a:lstStyle/>
+            <a:p>
+              <a:pPr algn="ctr"/>
+              <a:r>
+                <a:rPr lang="en-US" sz="1000" b="1" dirty="0">
+                  <a:latin typeface="Times New Roman" panose="02020603050405020304" pitchFamily="18" charset="0"/>
+                  <a:cs typeface="Times New Roman" panose="02020603050405020304" pitchFamily="18" charset="0"/>
+                </a:rPr>
+                <a:t>Entity</a:t>
+              </a:r>
+            </a:p>
+            <a:p>
+              <a:pPr algn="ctr"/>
+              <a:r>
+                <a:rPr lang="en-US" sz="1000" dirty="0">
+                  <a:latin typeface="Times New Roman" panose="02020603050405020304" pitchFamily="18" charset="0"/>
+                  <a:cs typeface="Times New Roman" panose="02020603050405020304" pitchFamily="18" charset="0"/>
+                </a:rPr>
+                <a:t>(clickable)</a:t>
+              </a:r>
+            </a:p>
+          </p:txBody>
+        </p:sp>
+        <p:sp>
+          <p:nvSpPr>
+            <p:cNvPr id="6" name="TextBox 5">
+              <a:extLst>
+                <a:ext uri="{FF2B5EF4-FFF2-40B4-BE49-F238E27FC236}">
+                  <a16:creationId xmlns:a16="http://schemas.microsoft.com/office/drawing/2014/main" id="{4E6481FB-2D7A-0648-B43C-2DD9F818D829}"/>
+                </a:ext>
+              </a:extLst>
+            </p:cNvPr>
+            <p:cNvSpPr txBox="1"/>
+            <p:nvPr/>
+          </p:nvSpPr>
+          <p:spPr>
+            <a:xfrm>
+              <a:off x="1937657" y="1660069"/>
+              <a:ext cx="991281" cy="461665"/>
+            </a:xfrm>
+            <a:prstGeom prst="rect">
+              <a:avLst/>
+            </a:prstGeom>
+            <a:noFill/>
+            <a:ln w="25400">
+              <a:solidFill>
+                <a:srgbClr val="0000FF"/>
+              </a:solidFill>
+            </a:ln>
+          </p:spPr>
+          <p:txBody>
+            <a:bodyPr wrap="square" rtlCol="0">
+              <a:spAutoFit/>
+            </a:bodyPr>
+            <a:lstStyle/>
+            <a:p>
+              <a:pPr algn="ctr"/>
+              <a:r>
+                <a:rPr lang="en-US" sz="800" b="1" dirty="0">
+                  <a:latin typeface="Times New Roman" panose="02020603050405020304" pitchFamily="18" charset="0"/>
+                  <a:cs typeface="Times New Roman" panose="02020603050405020304" pitchFamily="18" charset="0"/>
+                </a:rPr>
+                <a:t>Entity is part of disputed connection</a:t>
+              </a:r>
+            </a:p>
+          </p:txBody>
+        </p:sp>
+        <p:sp>
+          <p:nvSpPr>
+            <p:cNvPr id="7" name="TextBox 6">
+              <a:extLst>
+                <a:ext uri="{FF2B5EF4-FFF2-40B4-BE49-F238E27FC236}">
+                  <a16:creationId xmlns:a16="http://schemas.microsoft.com/office/drawing/2014/main" id="{EC8EA90A-3C8F-A943-B9E7-2BF0D07FBF46}"/>
+                </a:ext>
+              </a:extLst>
+            </p:cNvPr>
+            <p:cNvSpPr txBox="1"/>
+            <p:nvPr/>
+          </p:nvSpPr>
+          <p:spPr>
+            <a:xfrm>
+              <a:off x="1937656" y="2187457"/>
+              <a:ext cx="991281" cy="461665"/>
+            </a:xfrm>
+            <a:prstGeom prst="rect">
+              <a:avLst/>
+            </a:prstGeom>
+            <a:noFill/>
+            <a:ln w="25400">
+              <a:solidFill>
+                <a:srgbClr val="FF0000"/>
+              </a:solidFill>
+            </a:ln>
+          </p:spPr>
+          <p:txBody>
+            <a:bodyPr wrap="square" rtlCol="0">
+              <a:spAutoFit/>
+            </a:bodyPr>
+            <a:lstStyle/>
+            <a:p>
+              <a:pPr algn="ctr"/>
+              <a:r>
+                <a:rPr lang="en-US" sz="800" b="1" dirty="0">
+                  <a:latin typeface="Times New Roman" panose="02020603050405020304" pitchFamily="18" charset="0"/>
+                  <a:cs typeface="Times New Roman" panose="02020603050405020304" pitchFamily="18" charset="0"/>
+                </a:rPr>
+                <a:t>Entity has an unusual relationship</a:t>
+              </a:r>
+            </a:p>
+          </p:txBody>
+        </p:sp>
+        <p:cxnSp>
+          <p:nvCxnSpPr>
+            <p:cNvPr id="12" name="Straight Connector 11">
+              <a:extLst>
+                <a:ext uri="{FF2B5EF4-FFF2-40B4-BE49-F238E27FC236}">
+                  <a16:creationId xmlns:a16="http://schemas.microsoft.com/office/drawing/2014/main" id="{065F6BBA-C910-D641-8C2A-E788C37B39BB}"/>
+                </a:ext>
+              </a:extLst>
+            </p:cNvPr>
+            <p:cNvCxnSpPr>
+              <a:cxnSpLocks/>
+            </p:cNvCxnSpPr>
+            <p:nvPr/>
+          </p:nvCxnSpPr>
+          <p:spPr>
+            <a:xfrm>
+              <a:off x="3186113" y="1385888"/>
+              <a:ext cx="1625917" cy="0"/>
+            </a:xfrm>
+            <a:prstGeom prst="line">
+              <a:avLst/>
+            </a:prstGeom>
+            <a:ln w="25400">
+              <a:solidFill>
+                <a:schemeClr val="tx1"/>
+              </a:solidFill>
+            </a:ln>
+          </p:spPr>
+          <p:style>
+            <a:lnRef idx="1">
+              <a:schemeClr val="accent1"/>
+            </a:lnRef>
+            <a:fillRef idx="0">
+              <a:schemeClr val="accent1"/>
+            </a:fillRef>
+            <a:effectRef idx="0">
+              <a:schemeClr val="accent1"/>
+            </a:effectRef>
+            <a:fontRef idx="minor">
               <a:schemeClr val="tx1"/>
-            </a:solidFill>
-          </a:ln>
-        </p:spPr>
-        <p:txBody>
-          <a:bodyPr wrap="square" rtlCol="0">
-            <a:spAutoFit/>
-          </a:bodyPr>
-          <a:lstStyle/>
-          <a:p>
-            <a:pPr algn="ctr"/>
-            <a:r>
-              <a:rPr lang="en-US" sz="1000" b="1" dirty="0">
+            </a:fontRef>
+          </p:style>
+        </p:cxnSp>
+        <p:sp>
+          <p:nvSpPr>
+            <p:cNvPr id="14" name="Rectangle 13">
+              <a:extLst>
+                <a:ext uri="{FF2B5EF4-FFF2-40B4-BE49-F238E27FC236}">
+                  <a16:creationId xmlns:a16="http://schemas.microsoft.com/office/drawing/2014/main" id="{1744AF2A-952F-6640-B9AC-14EE9D9230D0}"/>
+                </a:ext>
+              </a:extLst>
+            </p:cNvPr>
+            <p:cNvSpPr/>
+            <p:nvPr/>
+          </p:nvSpPr>
+          <p:spPr>
+            <a:xfrm>
+              <a:off x="5088017" y="1585863"/>
+              <a:ext cx="727123" cy="338554"/>
+            </a:xfrm>
+            <a:prstGeom prst="rect">
+              <a:avLst/>
+            </a:prstGeom>
+          </p:spPr>
+          <p:txBody>
+            <a:bodyPr wrap="square">
+              <a:spAutoFit/>
+            </a:bodyPr>
+            <a:lstStyle/>
+            <a:p>
+              <a:pPr algn="ctr"/>
+              <a:r>
+                <a:rPr lang="en-US" sz="800" b="1" dirty="0">
+                  <a:latin typeface="Times New Roman" panose="02020603050405020304" pitchFamily="18" charset="0"/>
+                  <a:cs typeface="Times New Roman" panose="02020603050405020304" pitchFamily="18" charset="0"/>
+                </a:rPr>
+                <a:t>Born by autochthony</a:t>
+              </a:r>
+            </a:p>
+          </p:txBody>
+        </p:sp>
+        <p:cxnSp>
+          <p:nvCxnSpPr>
+            <p:cNvPr id="20" name="Straight Connector 19">
+              <a:extLst>
+                <a:ext uri="{FF2B5EF4-FFF2-40B4-BE49-F238E27FC236}">
+                  <a16:creationId xmlns:a16="http://schemas.microsoft.com/office/drawing/2014/main" id="{70AD63E3-4B13-D147-BFE0-37FFA20C5F8F}"/>
+                </a:ext>
+              </a:extLst>
+            </p:cNvPr>
+            <p:cNvCxnSpPr>
+              <a:cxnSpLocks/>
+            </p:cNvCxnSpPr>
+            <p:nvPr/>
+          </p:nvCxnSpPr>
+          <p:spPr>
+            <a:xfrm>
+              <a:off x="3186113" y="1895248"/>
+              <a:ext cx="1625917" cy="0"/>
+            </a:xfrm>
+            <a:prstGeom prst="line">
+              <a:avLst/>
+            </a:prstGeom>
+            <a:ln w="25400">
+              <a:solidFill>
+                <a:srgbClr val="0000FF"/>
+              </a:solidFill>
+            </a:ln>
+          </p:spPr>
+          <p:style>
+            <a:lnRef idx="1">
+              <a:schemeClr val="accent1"/>
+            </a:lnRef>
+            <a:fillRef idx="0">
+              <a:schemeClr val="accent1"/>
+            </a:fillRef>
+            <a:effectRef idx="0">
+              <a:schemeClr val="accent1"/>
+            </a:effectRef>
+            <a:fontRef idx="minor">
+              <a:schemeClr val="tx1"/>
+            </a:fontRef>
+          </p:style>
+        </p:cxnSp>
+        <p:sp>
+          <p:nvSpPr>
+            <p:cNvPr id="21" name="Rectangle 20">
+              <a:extLst>
+                <a:ext uri="{FF2B5EF4-FFF2-40B4-BE49-F238E27FC236}">
+                  <a16:creationId xmlns:a16="http://schemas.microsoft.com/office/drawing/2014/main" id="{2AC6FA2B-9C36-4D4B-AD1B-6FB3EDCAC089}"/>
+                </a:ext>
+              </a:extLst>
+            </p:cNvPr>
+            <p:cNvSpPr/>
+            <p:nvPr/>
+          </p:nvSpPr>
+          <p:spPr>
+            <a:xfrm>
+              <a:off x="3274918" y="1643906"/>
+              <a:ext cx="1454245" cy="246221"/>
+            </a:xfrm>
+            <a:prstGeom prst="rect">
+              <a:avLst/>
+            </a:prstGeom>
+          </p:spPr>
+          <p:txBody>
+            <a:bodyPr wrap="square">
+              <a:spAutoFit/>
+            </a:bodyPr>
+            <a:lstStyle/>
+            <a:p>
+              <a:pPr algn="ctr"/>
+              <a:r>
+                <a:rPr lang="en-US" sz="1000" b="1" dirty="0">
+                  <a:latin typeface="Times New Roman" panose="02020603050405020304" pitchFamily="18" charset="0"/>
+                  <a:cs typeface="Times New Roman" panose="02020603050405020304" pitchFamily="18" charset="0"/>
+                </a:rPr>
+                <a:t>contested relationship</a:t>
+              </a:r>
+            </a:p>
+          </p:txBody>
+        </p:sp>
+        <p:cxnSp>
+          <p:nvCxnSpPr>
+            <p:cNvPr id="22" name="Straight Connector 21">
+              <a:extLst>
+                <a:ext uri="{FF2B5EF4-FFF2-40B4-BE49-F238E27FC236}">
+                  <a16:creationId xmlns:a16="http://schemas.microsoft.com/office/drawing/2014/main" id="{1B5A2F59-A9F6-204D-BC6C-AE75C4644790}"/>
+                </a:ext>
+              </a:extLst>
+            </p:cNvPr>
+            <p:cNvCxnSpPr>
+              <a:cxnSpLocks/>
+            </p:cNvCxnSpPr>
+            <p:nvPr/>
+          </p:nvCxnSpPr>
+          <p:spPr>
+            <a:xfrm>
+              <a:off x="3186113" y="2416714"/>
+              <a:ext cx="1625917" cy="0"/>
+            </a:xfrm>
+            <a:prstGeom prst="line">
+              <a:avLst/>
+            </a:prstGeom>
+            <a:ln w="25400">
+              <a:solidFill>
+                <a:srgbClr val="FF0000"/>
+              </a:solidFill>
+            </a:ln>
+          </p:spPr>
+          <p:style>
+            <a:lnRef idx="1">
+              <a:schemeClr val="accent1"/>
+            </a:lnRef>
+            <a:fillRef idx="0">
+              <a:schemeClr val="accent1"/>
+            </a:fillRef>
+            <a:effectRef idx="0">
+              <a:schemeClr val="accent1"/>
+            </a:effectRef>
+            <a:fontRef idx="minor">
+              <a:schemeClr val="tx1"/>
+            </a:fontRef>
+          </p:style>
+        </p:cxnSp>
+        <p:sp>
+          <p:nvSpPr>
+            <p:cNvPr id="23" name="Rectangle 22">
+              <a:extLst>
+                <a:ext uri="{FF2B5EF4-FFF2-40B4-BE49-F238E27FC236}">
+                  <a16:creationId xmlns:a16="http://schemas.microsoft.com/office/drawing/2014/main" id="{ED102570-68B7-494F-9AEB-60E6BDB7A3A7}"/>
+                </a:ext>
+              </a:extLst>
+            </p:cNvPr>
+            <p:cNvSpPr/>
+            <p:nvPr/>
+          </p:nvSpPr>
+          <p:spPr>
+            <a:xfrm>
+              <a:off x="3274918" y="2165372"/>
+              <a:ext cx="1454245" cy="246221"/>
+            </a:xfrm>
+            <a:prstGeom prst="rect">
+              <a:avLst/>
+            </a:prstGeom>
+          </p:spPr>
+          <p:txBody>
+            <a:bodyPr wrap="square">
+              <a:spAutoFit/>
+            </a:bodyPr>
+            <a:lstStyle/>
+            <a:p>
+              <a:pPr algn="ctr"/>
+              <a:r>
+                <a:rPr lang="en-US" sz="1000" b="1" dirty="0">
+                  <a:latin typeface="Times New Roman" panose="02020603050405020304" pitchFamily="18" charset="0"/>
+                  <a:cs typeface="Times New Roman" panose="02020603050405020304" pitchFamily="18" charset="0"/>
+                </a:rPr>
+                <a:t>unusual relationship</a:t>
+              </a:r>
+            </a:p>
+          </p:txBody>
+        </p:sp>
+        <p:sp>
+          <p:nvSpPr>
+            <p:cNvPr id="29" name="Rectangle 28">
+              <a:extLst>
+                <a:ext uri="{FF2B5EF4-FFF2-40B4-BE49-F238E27FC236}">
+                  <a16:creationId xmlns:a16="http://schemas.microsoft.com/office/drawing/2014/main" id="{E9C4C8DE-56FE-D74C-AA38-04767D714117}"/>
+                </a:ext>
+              </a:extLst>
+            </p:cNvPr>
+            <p:cNvSpPr/>
+            <p:nvPr/>
+          </p:nvSpPr>
+          <p:spPr>
+            <a:xfrm>
+              <a:off x="4954468" y="2351805"/>
+              <a:ext cx="991281" cy="338554"/>
+            </a:xfrm>
+            <a:prstGeom prst="rect">
+              <a:avLst/>
+            </a:prstGeom>
+          </p:spPr>
+          <p:txBody>
+            <a:bodyPr wrap="square">
+              <a:spAutoFit/>
+            </a:bodyPr>
+            <a:lstStyle/>
+            <a:p>
+              <a:pPr algn="ctr"/>
+              <a:r>
+                <a:rPr lang="en-US" sz="800" b="1" dirty="0">
+                  <a:latin typeface="Times New Roman" panose="02020603050405020304" pitchFamily="18" charset="0"/>
+                  <a:cs typeface="Times New Roman" panose="02020603050405020304" pitchFamily="18" charset="0"/>
+                </a:rPr>
+                <a:t>Born by parthenogenesis</a:t>
+              </a:r>
+            </a:p>
+          </p:txBody>
+        </p:sp>
+        <p:pic>
+          <p:nvPicPr>
+            <p:cNvPr id="32" name="Picture 31">
+              <a:extLst>
+                <a:ext uri="{FF2B5EF4-FFF2-40B4-BE49-F238E27FC236}">
+                  <a16:creationId xmlns:a16="http://schemas.microsoft.com/office/drawing/2014/main" id="{D6EA7A0F-3BEA-B54F-B09E-985C2F5F8190}"/>
+                </a:ext>
+              </a:extLst>
+            </p:cNvPr>
+            <p:cNvPicPr>
+              <a:picLocks noChangeAspect="1"/>
+            </p:cNvPicPr>
+            <p:nvPr/>
+          </p:nvPicPr>
+          <p:blipFill>
+            <a:blip r:embed="rId2"/>
+            <a:stretch>
+              <a:fillRect/>
+            </a:stretch>
+          </p:blipFill>
+          <p:spPr>
+            <a:xfrm>
+              <a:off x="6047217" y="1158475"/>
+              <a:ext cx="439200" cy="439200"/>
+            </a:xfrm>
+            <a:prstGeom prst="rect">
+              <a:avLst/>
+            </a:prstGeom>
+          </p:spPr>
+        </p:pic>
+        <p:sp>
+          <p:nvSpPr>
+            <p:cNvPr id="33" name="Rectangle 32">
+              <a:extLst>
+                <a:ext uri="{FF2B5EF4-FFF2-40B4-BE49-F238E27FC236}">
+                  <a16:creationId xmlns:a16="http://schemas.microsoft.com/office/drawing/2014/main" id="{73758267-16A0-4540-9D88-94C1960AFC8F}"/>
+                </a:ext>
+              </a:extLst>
+            </p:cNvPr>
+            <p:cNvSpPr/>
+            <p:nvPr/>
+          </p:nvSpPr>
+          <p:spPr>
+            <a:xfrm>
+              <a:off x="5906871" y="1585863"/>
+              <a:ext cx="727123" cy="338554"/>
+            </a:xfrm>
+            <a:prstGeom prst="rect">
+              <a:avLst/>
+            </a:prstGeom>
+          </p:spPr>
+          <p:txBody>
+            <a:bodyPr wrap="square">
+              <a:spAutoFit/>
+            </a:bodyPr>
+            <a:lstStyle/>
+            <a:p>
+              <a:pPr algn="ctr"/>
+              <a:r>
+                <a:rPr lang="en-US" sz="800" b="1" dirty="0">
+                  <a:latin typeface="Times New Roman" panose="02020603050405020304" pitchFamily="18" charset="0"/>
+                  <a:cs typeface="Times New Roman" panose="02020603050405020304" pitchFamily="18" charset="0"/>
+                </a:rPr>
+                <a:t>Born from an object</a:t>
+              </a:r>
+            </a:p>
+          </p:txBody>
+        </p:sp>
+        <p:sp>
+          <p:nvSpPr>
+            <p:cNvPr id="36" name="Rectangle 35">
+              <a:extLst>
+                <a:ext uri="{FF2B5EF4-FFF2-40B4-BE49-F238E27FC236}">
+                  <a16:creationId xmlns:a16="http://schemas.microsoft.com/office/drawing/2014/main" id="{58B0E58A-C947-E546-BF11-2AE933151FC0}"/>
+                </a:ext>
+              </a:extLst>
+            </p:cNvPr>
+            <p:cNvSpPr/>
+            <p:nvPr/>
+          </p:nvSpPr>
+          <p:spPr>
+            <a:xfrm>
+              <a:off x="5763413" y="2351805"/>
+              <a:ext cx="991281" cy="338554"/>
+            </a:xfrm>
+            <a:prstGeom prst="rect">
+              <a:avLst/>
+            </a:prstGeom>
+          </p:spPr>
+          <p:txBody>
+            <a:bodyPr wrap="square">
+              <a:spAutoFit/>
+            </a:bodyPr>
+            <a:lstStyle/>
+            <a:p>
+              <a:pPr algn="ctr"/>
+              <a:r>
+                <a:rPr lang="en-US" sz="800" b="1" dirty="0">
+                  <a:latin typeface="Times New Roman" panose="02020603050405020304" pitchFamily="18" charset="0"/>
+                  <a:cs typeface="Times New Roman" panose="02020603050405020304" pitchFamily="18" charset="0"/>
+                </a:rPr>
+                <a:t>Creation </a:t>
+              </a:r>
+            </a:p>
+            <a:p>
+              <a:pPr algn="ctr"/>
+              <a:r>
+                <a:rPr lang="en-US" sz="800" b="1" dirty="0">
+                  <a:latin typeface="Times New Roman" panose="02020603050405020304" pitchFamily="18" charset="0"/>
+                  <a:cs typeface="Times New Roman" panose="02020603050405020304" pitchFamily="18" charset="0"/>
+                </a:rPr>
+                <a:t>without parents</a:t>
+              </a:r>
+            </a:p>
+          </p:txBody>
+        </p:sp>
+        <p:sp>
+          <p:nvSpPr>
+            <p:cNvPr id="37" name="TextBox 36">
+              <a:extLst>
+                <a:ext uri="{FF2B5EF4-FFF2-40B4-BE49-F238E27FC236}">
+                  <a16:creationId xmlns:a16="http://schemas.microsoft.com/office/drawing/2014/main" id="{5A6BBCDE-B6FA-0F42-9CF3-5ADE63029982}"/>
+                </a:ext>
+              </a:extLst>
+            </p:cNvPr>
+            <p:cNvSpPr txBox="1"/>
+            <p:nvPr/>
+          </p:nvSpPr>
+          <p:spPr>
+            <a:xfrm>
+              <a:off x="6883949" y="1195718"/>
+              <a:ext cx="250320" cy="149249"/>
+            </a:xfrm>
+            <a:prstGeom prst="rect">
+              <a:avLst/>
+            </a:prstGeom>
+            <a:noFill/>
+            <a:ln w="25400">
+              <a:solidFill>
+                <a:schemeClr val="tx1"/>
+              </a:solidFill>
+            </a:ln>
+          </p:spPr>
+          <p:txBody>
+            <a:bodyPr wrap="square" rtlCol="0">
+              <a:spAutoFit/>
+            </a:bodyPr>
+            <a:lstStyle/>
+            <a:p>
+              <a:pPr algn="ctr"/>
+              <a:endParaRPr lang="en-US" sz="1000" b="1" dirty="0">
                 <a:latin typeface="Times New Roman" panose="02020603050405020304" pitchFamily="18" charset="0"/>
                 <a:cs typeface="Times New Roman" panose="02020603050405020304" pitchFamily="18" charset="0"/>
-              </a:rPr>
-              <a:t>Entity</a:t>
-            </a:r>
-          </a:p>
-          <a:p>
-            <a:pPr algn="ctr"/>
-            <a:r>
-              <a:rPr lang="en-US" sz="1000" dirty="0">
-                <a:latin typeface="Times New Roman" panose="02020603050405020304" pitchFamily="18" charset="0"/>
-                <a:cs typeface="Times New Roman" panose="02020603050405020304" pitchFamily="18" charset="0"/>
-              </a:rPr>
-              <a:t>(clickable)</a:t>
-            </a:r>
-          </a:p>
-        </p:txBody>
-      </p:sp>
-      <p:sp>
-        <p:nvSpPr>
-          <p:cNvPr id="6" name="TextBox 5">
-            <a:extLst>
-              <a:ext uri="{FF2B5EF4-FFF2-40B4-BE49-F238E27FC236}">
-                <a16:creationId xmlns:a16="http://schemas.microsoft.com/office/drawing/2014/main" id="{4E6481FB-2D7A-0648-B43C-2DD9F818D829}"/>
-              </a:ext>
-            </a:extLst>
-          </p:cNvPr>
-          <p:cNvSpPr txBox="1"/>
-          <p:nvPr/>
-        </p:nvSpPr>
-        <p:spPr>
-          <a:xfrm>
-            <a:off x="1937657" y="1660069"/>
-            <a:ext cx="991281" cy="461665"/>
-          </a:xfrm>
-          <a:prstGeom prst="rect">
-            <a:avLst/>
-          </a:prstGeom>
-          <a:noFill/>
-          <a:ln w="25400">
-            <a:solidFill>
-              <a:srgbClr val="0000FF"/>
-            </a:solidFill>
-          </a:ln>
-        </p:spPr>
-        <p:txBody>
-          <a:bodyPr wrap="square" rtlCol="0">
-            <a:spAutoFit/>
-          </a:bodyPr>
-          <a:lstStyle/>
-          <a:p>
-            <a:pPr algn="ctr"/>
-            <a:r>
-              <a:rPr lang="en-US" sz="800" b="1" dirty="0">
-                <a:latin typeface="Times New Roman" panose="02020603050405020304" pitchFamily="18" charset="0"/>
-                <a:cs typeface="Times New Roman" panose="02020603050405020304" pitchFamily="18" charset="0"/>
-              </a:rPr>
-              <a:t>Entity is part of disputed connection</a:t>
-            </a:r>
-          </a:p>
-        </p:txBody>
-      </p:sp>
-      <p:sp>
-        <p:nvSpPr>
-          <p:cNvPr id="7" name="TextBox 6">
-            <a:extLst>
-              <a:ext uri="{FF2B5EF4-FFF2-40B4-BE49-F238E27FC236}">
-                <a16:creationId xmlns:a16="http://schemas.microsoft.com/office/drawing/2014/main" id="{EC8EA90A-3C8F-A943-B9E7-2BF0D07FBF46}"/>
-              </a:ext>
-            </a:extLst>
-          </p:cNvPr>
-          <p:cNvSpPr txBox="1"/>
-          <p:nvPr/>
-        </p:nvSpPr>
-        <p:spPr>
-          <a:xfrm>
-            <a:off x="1937656" y="2187457"/>
-            <a:ext cx="991281" cy="461665"/>
-          </a:xfrm>
-          <a:prstGeom prst="rect">
-            <a:avLst/>
-          </a:prstGeom>
-          <a:noFill/>
-          <a:ln w="25400">
-            <a:solidFill>
-              <a:srgbClr val="FF0000"/>
-            </a:solidFill>
-          </a:ln>
-        </p:spPr>
-        <p:txBody>
-          <a:bodyPr wrap="square" rtlCol="0">
-            <a:spAutoFit/>
-          </a:bodyPr>
-          <a:lstStyle/>
-          <a:p>
-            <a:pPr algn="ctr"/>
-            <a:r>
-              <a:rPr lang="en-US" sz="800" b="1" dirty="0">
-                <a:latin typeface="Times New Roman" panose="02020603050405020304" pitchFamily="18" charset="0"/>
-                <a:cs typeface="Times New Roman" panose="02020603050405020304" pitchFamily="18" charset="0"/>
-              </a:rPr>
-              <a:t>Entity has an unusual relationship</a:t>
-            </a:r>
-          </a:p>
-        </p:txBody>
-      </p:sp>
-      <p:cxnSp>
-        <p:nvCxnSpPr>
-          <p:cNvPr id="12" name="Straight Connector 11">
-            <a:extLst>
-              <a:ext uri="{FF2B5EF4-FFF2-40B4-BE49-F238E27FC236}">
-                <a16:creationId xmlns:a16="http://schemas.microsoft.com/office/drawing/2014/main" id="{065F6BBA-C910-D641-8C2A-E788C37B39BB}"/>
-              </a:ext>
-            </a:extLst>
-          </p:cNvPr>
-          <p:cNvCxnSpPr>
-            <a:cxnSpLocks/>
-          </p:cNvCxnSpPr>
-          <p:nvPr/>
-        </p:nvCxnSpPr>
-        <p:spPr>
-          <a:xfrm>
-            <a:off x="3186113" y="1385888"/>
-            <a:ext cx="1625917" cy="0"/>
-          </a:xfrm>
-          <a:prstGeom prst="line">
-            <a:avLst/>
-          </a:prstGeom>
-          <a:ln w="25400">
-            <a:solidFill>
+              </a:endParaRPr>
+            </a:p>
+          </p:txBody>
+        </p:sp>
+        <p:sp>
+          <p:nvSpPr>
+            <p:cNvPr id="38" name="Rectangle 37">
+              <a:extLst>
+                <a:ext uri="{FF2B5EF4-FFF2-40B4-BE49-F238E27FC236}">
+                  <a16:creationId xmlns:a16="http://schemas.microsoft.com/office/drawing/2014/main" id="{EF655070-1063-9A4C-829A-54C7E94B88A0}"/>
+                </a:ext>
+              </a:extLst>
+            </p:cNvPr>
+            <p:cNvSpPr/>
+            <p:nvPr/>
+          </p:nvSpPr>
+          <p:spPr>
+            <a:xfrm>
+              <a:off x="3281355" y="1158475"/>
+              <a:ext cx="1454245" cy="246221"/>
+            </a:xfrm>
+            <a:prstGeom prst="rect">
+              <a:avLst/>
+            </a:prstGeom>
+          </p:spPr>
+          <p:txBody>
+            <a:bodyPr wrap="square">
+              <a:spAutoFit/>
+            </a:bodyPr>
+            <a:lstStyle/>
+            <a:p>
+              <a:pPr algn="ctr"/>
+              <a:r>
+                <a:rPr lang="en-US" sz="1000" b="1" dirty="0">
+                  <a:latin typeface="Times New Roman" panose="02020603050405020304" pitchFamily="18" charset="0"/>
+                  <a:cs typeface="Times New Roman" panose="02020603050405020304" pitchFamily="18" charset="0"/>
+                </a:rPr>
+                <a:t>traditional relationship</a:t>
+              </a:r>
+            </a:p>
+          </p:txBody>
+        </p:sp>
+        <p:cxnSp>
+          <p:nvCxnSpPr>
+            <p:cNvPr id="39" name="Straight Connector 38">
+              <a:extLst>
+                <a:ext uri="{FF2B5EF4-FFF2-40B4-BE49-F238E27FC236}">
+                  <a16:creationId xmlns:a16="http://schemas.microsoft.com/office/drawing/2014/main" id="{9B605256-F7B5-4B44-8C91-B72D4FA68DBD}"/>
+                </a:ext>
+              </a:extLst>
+            </p:cNvPr>
+            <p:cNvCxnSpPr>
+              <a:cxnSpLocks/>
+              <a:endCxn id="37" idx="2"/>
+            </p:cNvCxnSpPr>
+            <p:nvPr/>
+          </p:nvCxnSpPr>
+          <p:spPr>
+            <a:xfrm flipV="1">
+              <a:off x="7009109" y="1344967"/>
+              <a:ext cx="0" cy="181472"/>
+            </a:xfrm>
+            <a:prstGeom prst="line">
+              <a:avLst/>
+            </a:prstGeom>
+            <a:ln w="25400">
+              <a:solidFill>
+                <a:schemeClr val="tx1"/>
+              </a:solidFill>
+            </a:ln>
+          </p:spPr>
+          <p:style>
+            <a:lnRef idx="1">
+              <a:schemeClr val="accent1"/>
+            </a:lnRef>
+            <a:fillRef idx="0">
+              <a:schemeClr val="accent1"/>
+            </a:fillRef>
+            <a:effectRef idx="0">
+              <a:schemeClr val="accent1"/>
+            </a:effectRef>
+            <a:fontRef idx="minor">
               <a:schemeClr val="tx1"/>
-            </a:solidFill>
-          </a:ln>
-        </p:spPr>
-        <p:style>
-          <a:lnRef idx="1">
-            <a:schemeClr val="accent1"/>
-          </a:lnRef>
-          <a:fillRef idx="0">
-            <a:schemeClr val="accent1"/>
-          </a:fillRef>
-          <a:effectRef idx="0">
-            <a:schemeClr val="accent1"/>
-          </a:effectRef>
-          <a:fontRef idx="minor">
-            <a:schemeClr val="tx1"/>
-          </a:fontRef>
-        </p:style>
-      </p:cxnSp>
-      <p:sp>
-        <p:nvSpPr>
-          <p:cNvPr id="14" name="Rectangle 13">
-            <a:extLst>
-              <a:ext uri="{FF2B5EF4-FFF2-40B4-BE49-F238E27FC236}">
-                <a16:creationId xmlns:a16="http://schemas.microsoft.com/office/drawing/2014/main" id="{1744AF2A-952F-6640-B9AC-14EE9D9230D0}"/>
-              </a:ext>
-            </a:extLst>
-          </p:cNvPr>
-          <p:cNvSpPr/>
-          <p:nvPr/>
-        </p:nvSpPr>
-        <p:spPr>
-          <a:xfrm>
-            <a:off x="5088017" y="1585863"/>
-            <a:ext cx="727123" cy="338554"/>
-          </a:xfrm>
-          <a:prstGeom prst="rect">
-            <a:avLst/>
-          </a:prstGeom>
-        </p:spPr>
-        <p:txBody>
-          <a:bodyPr wrap="square">
-            <a:spAutoFit/>
-          </a:bodyPr>
-          <a:lstStyle/>
-          <a:p>
-            <a:pPr algn="ctr"/>
-            <a:r>
-              <a:rPr lang="en-US" sz="800" b="1" dirty="0">
-                <a:latin typeface="Times New Roman" panose="02020603050405020304" pitchFamily="18" charset="0"/>
-                <a:cs typeface="Times New Roman" panose="02020603050405020304" pitchFamily="18" charset="0"/>
-              </a:rPr>
-              <a:t>Born by autochthony</a:t>
-            </a:r>
-          </a:p>
-        </p:txBody>
-      </p:sp>
-      <p:cxnSp>
-        <p:nvCxnSpPr>
-          <p:cNvPr id="20" name="Straight Connector 19">
-            <a:extLst>
-              <a:ext uri="{FF2B5EF4-FFF2-40B4-BE49-F238E27FC236}">
-                <a16:creationId xmlns:a16="http://schemas.microsoft.com/office/drawing/2014/main" id="{70AD63E3-4B13-D147-BFE0-37FFA20C5F8F}"/>
-              </a:ext>
-            </a:extLst>
-          </p:cNvPr>
-          <p:cNvCxnSpPr>
-            <a:cxnSpLocks/>
-          </p:cNvCxnSpPr>
-          <p:nvPr/>
-        </p:nvCxnSpPr>
-        <p:spPr>
-          <a:xfrm>
-            <a:off x="3186113" y="1895248"/>
-            <a:ext cx="1625917" cy="0"/>
-          </a:xfrm>
-          <a:prstGeom prst="line">
-            <a:avLst/>
-          </a:prstGeom>
-          <a:ln w="25400">
-            <a:solidFill>
-              <a:srgbClr val="0000FF"/>
-            </a:solidFill>
-          </a:ln>
-        </p:spPr>
-        <p:style>
-          <a:lnRef idx="1">
-            <a:schemeClr val="accent1"/>
-          </a:lnRef>
-          <a:fillRef idx="0">
-            <a:schemeClr val="accent1"/>
-          </a:fillRef>
-          <a:effectRef idx="0">
-            <a:schemeClr val="accent1"/>
-          </a:effectRef>
-          <a:fontRef idx="minor">
-            <a:schemeClr val="tx1"/>
-          </a:fontRef>
-        </p:style>
-      </p:cxnSp>
-      <p:sp>
-        <p:nvSpPr>
-          <p:cNvPr id="21" name="Rectangle 20">
-            <a:extLst>
-              <a:ext uri="{FF2B5EF4-FFF2-40B4-BE49-F238E27FC236}">
-                <a16:creationId xmlns:a16="http://schemas.microsoft.com/office/drawing/2014/main" id="{2AC6FA2B-9C36-4D4B-AD1B-6FB3EDCAC089}"/>
-              </a:ext>
-            </a:extLst>
-          </p:cNvPr>
-          <p:cNvSpPr/>
-          <p:nvPr/>
-        </p:nvSpPr>
-        <p:spPr>
-          <a:xfrm>
-            <a:off x="3274918" y="1643906"/>
-            <a:ext cx="1454245" cy="246221"/>
-          </a:xfrm>
-          <a:prstGeom prst="rect">
-            <a:avLst/>
-          </a:prstGeom>
-        </p:spPr>
-        <p:txBody>
-          <a:bodyPr wrap="square">
-            <a:spAutoFit/>
-          </a:bodyPr>
-          <a:lstStyle/>
-          <a:p>
-            <a:pPr algn="ctr"/>
-            <a:r>
-              <a:rPr lang="en-US" sz="1000" b="1" dirty="0">
-                <a:latin typeface="Times New Roman" panose="02020603050405020304" pitchFamily="18" charset="0"/>
-                <a:cs typeface="Times New Roman" panose="02020603050405020304" pitchFamily="18" charset="0"/>
-              </a:rPr>
-              <a:t>contested relationship</a:t>
-            </a:r>
-          </a:p>
-        </p:txBody>
-      </p:sp>
-      <p:cxnSp>
-        <p:nvCxnSpPr>
-          <p:cNvPr id="22" name="Straight Connector 21">
-            <a:extLst>
-              <a:ext uri="{FF2B5EF4-FFF2-40B4-BE49-F238E27FC236}">
-                <a16:creationId xmlns:a16="http://schemas.microsoft.com/office/drawing/2014/main" id="{1B5A2F59-A9F6-204D-BC6C-AE75C4644790}"/>
-              </a:ext>
-            </a:extLst>
-          </p:cNvPr>
-          <p:cNvCxnSpPr>
-            <a:cxnSpLocks/>
-          </p:cNvCxnSpPr>
-          <p:nvPr/>
-        </p:nvCxnSpPr>
-        <p:spPr>
-          <a:xfrm>
-            <a:off x="3186113" y="2416714"/>
-            <a:ext cx="1625917" cy="0"/>
-          </a:xfrm>
-          <a:prstGeom prst="line">
-            <a:avLst/>
-          </a:prstGeom>
-          <a:ln w="25400">
-            <a:solidFill>
-              <a:srgbClr val="FF0000"/>
-            </a:solidFill>
-          </a:ln>
-        </p:spPr>
-        <p:style>
-          <a:lnRef idx="1">
-            <a:schemeClr val="accent1"/>
-          </a:lnRef>
-          <a:fillRef idx="0">
-            <a:schemeClr val="accent1"/>
-          </a:fillRef>
-          <a:effectRef idx="0">
-            <a:schemeClr val="accent1"/>
-          </a:effectRef>
-          <a:fontRef idx="minor">
-            <a:schemeClr val="tx1"/>
-          </a:fontRef>
-        </p:style>
-      </p:cxnSp>
-      <p:sp>
-        <p:nvSpPr>
-          <p:cNvPr id="23" name="Rectangle 22">
-            <a:extLst>
-              <a:ext uri="{FF2B5EF4-FFF2-40B4-BE49-F238E27FC236}">
-                <a16:creationId xmlns:a16="http://schemas.microsoft.com/office/drawing/2014/main" id="{ED102570-68B7-494F-9AEB-60E6BDB7A3A7}"/>
-              </a:ext>
-            </a:extLst>
-          </p:cNvPr>
-          <p:cNvSpPr/>
-          <p:nvPr/>
-        </p:nvSpPr>
-        <p:spPr>
-          <a:xfrm>
-            <a:off x="3274918" y="2165372"/>
-            <a:ext cx="1454245" cy="246221"/>
-          </a:xfrm>
-          <a:prstGeom prst="rect">
-            <a:avLst/>
-          </a:prstGeom>
-        </p:spPr>
-        <p:txBody>
-          <a:bodyPr wrap="square">
-            <a:spAutoFit/>
-          </a:bodyPr>
-          <a:lstStyle/>
-          <a:p>
-            <a:pPr algn="ctr"/>
-            <a:r>
-              <a:rPr lang="en-US" sz="1000" b="1" dirty="0">
-                <a:latin typeface="Times New Roman" panose="02020603050405020304" pitchFamily="18" charset="0"/>
-                <a:cs typeface="Times New Roman" panose="02020603050405020304" pitchFamily="18" charset="0"/>
-              </a:rPr>
-              <a:t>unusual relationship</a:t>
-            </a:r>
-          </a:p>
-        </p:txBody>
-      </p:sp>
-      <p:sp>
-        <p:nvSpPr>
-          <p:cNvPr id="29" name="Rectangle 28">
-            <a:extLst>
-              <a:ext uri="{FF2B5EF4-FFF2-40B4-BE49-F238E27FC236}">
-                <a16:creationId xmlns:a16="http://schemas.microsoft.com/office/drawing/2014/main" id="{E9C4C8DE-56FE-D74C-AA38-04767D714117}"/>
-              </a:ext>
-            </a:extLst>
-          </p:cNvPr>
-          <p:cNvSpPr/>
-          <p:nvPr/>
-        </p:nvSpPr>
-        <p:spPr>
-          <a:xfrm>
-            <a:off x="4954468" y="2351805"/>
-            <a:ext cx="991281" cy="338554"/>
-          </a:xfrm>
-          <a:prstGeom prst="rect">
-            <a:avLst/>
-          </a:prstGeom>
-        </p:spPr>
-        <p:txBody>
-          <a:bodyPr wrap="square">
-            <a:spAutoFit/>
-          </a:bodyPr>
-          <a:lstStyle/>
-          <a:p>
-            <a:pPr algn="ctr"/>
-            <a:r>
-              <a:rPr lang="en-US" sz="800" b="1" dirty="0">
-                <a:latin typeface="Times New Roman" panose="02020603050405020304" pitchFamily="18" charset="0"/>
-                <a:cs typeface="Times New Roman" panose="02020603050405020304" pitchFamily="18" charset="0"/>
-              </a:rPr>
-              <a:t>Born by parthenogenesis</a:t>
-            </a:r>
-          </a:p>
-        </p:txBody>
-      </p:sp>
-      <p:pic>
-        <p:nvPicPr>
-          <p:cNvPr id="32" name="Picture 31">
-            <a:extLst>
-              <a:ext uri="{FF2B5EF4-FFF2-40B4-BE49-F238E27FC236}">
-                <a16:creationId xmlns:a16="http://schemas.microsoft.com/office/drawing/2014/main" id="{D6EA7A0F-3BEA-B54F-B09E-985C2F5F8190}"/>
-              </a:ext>
-            </a:extLst>
-          </p:cNvPr>
-          <p:cNvPicPr>
-            <a:picLocks noChangeAspect="1"/>
-          </p:cNvPicPr>
-          <p:nvPr/>
-        </p:nvPicPr>
-        <p:blipFill>
-          <a:blip r:embed="rId2"/>
-          <a:stretch>
-            <a:fillRect/>
-          </a:stretch>
-        </p:blipFill>
-        <p:spPr>
-          <a:xfrm>
-            <a:off x="6047217" y="1158475"/>
-            <a:ext cx="438292" cy="438292"/>
-          </a:xfrm>
-          <a:prstGeom prst="rect">
-            <a:avLst/>
-          </a:prstGeom>
-        </p:spPr>
-      </p:pic>
-      <p:sp>
-        <p:nvSpPr>
-          <p:cNvPr id="33" name="Rectangle 32">
-            <a:extLst>
-              <a:ext uri="{FF2B5EF4-FFF2-40B4-BE49-F238E27FC236}">
-                <a16:creationId xmlns:a16="http://schemas.microsoft.com/office/drawing/2014/main" id="{73758267-16A0-4540-9D88-94C1960AFC8F}"/>
-              </a:ext>
-            </a:extLst>
-          </p:cNvPr>
-          <p:cNvSpPr/>
-          <p:nvPr/>
-        </p:nvSpPr>
-        <p:spPr>
-          <a:xfrm>
-            <a:off x="5906871" y="1585863"/>
-            <a:ext cx="727123" cy="338554"/>
-          </a:xfrm>
-          <a:prstGeom prst="rect">
-            <a:avLst/>
-          </a:prstGeom>
-        </p:spPr>
-        <p:txBody>
-          <a:bodyPr wrap="square">
-            <a:spAutoFit/>
-          </a:bodyPr>
-          <a:lstStyle/>
-          <a:p>
-            <a:pPr algn="ctr"/>
-            <a:r>
-              <a:rPr lang="en-US" sz="800" b="1" dirty="0">
-                <a:latin typeface="Times New Roman" panose="02020603050405020304" pitchFamily="18" charset="0"/>
-                <a:cs typeface="Times New Roman" panose="02020603050405020304" pitchFamily="18" charset="0"/>
-              </a:rPr>
-              <a:t>Born from an object</a:t>
-            </a:r>
-          </a:p>
-        </p:txBody>
-      </p:sp>
-      <p:sp>
-        <p:nvSpPr>
-          <p:cNvPr id="36" name="Rectangle 35">
-            <a:extLst>
-              <a:ext uri="{FF2B5EF4-FFF2-40B4-BE49-F238E27FC236}">
-                <a16:creationId xmlns:a16="http://schemas.microsoft.com/office/drawing/2014/main" id="{58B0E58A-C947-E546-BF11-2AE933151FC0}"/>
-              </a:ext>
-            </a:extLst>
-          </p:cNvPr>
-          <p:cNvSpPr/>
-          <p:nvPr/>
-        </p:nvSpPr>
-        <p:spPr>
-          <a:xfrm>
-            <a:off x="5763413" y="2351805"/>
-            <a:ext cx="991281" cy="338554"/>
-          </a:xfrm>
-          <a:prstGeom prst="rect">
-            <a:avLst/>
-          </a:prstGeom>
-        </p:spPr>
-        <p:txBody>
-          <a:bodyPr wrap="square">
-            <a:spAutoFit/>
-          </a:bodyPr>
-          <a:lstStyle/>
-          <a:p>
-            <a:pPr algn="ctr"/>
-            <a:r>
-              <a:rPr lang="en-US" sz="800" b="1" dirty="0">
-                <a:latin typeface="Times New Roman" panose="02020603050405020304" pitchFamily="18" charset="0"/>
-                <a:cs typeface="Times New Roman" panose="02020603050405020304" pitchFamily="18" charset="0"/>
-              </a:rPr>
-              <a:t>Creation </a:t>
-            </a:r>
-          </a:p>
-          <a:p>
-            <a:pPr algn="ctr"/>
-            <a:r>
-              <a:rPr lang="en-US" sz="800" b="1" dirty="0">
-                <a:latin typeface="Times New Roman" panose="02020603050405020304" pitchFamily="18" charset="0"/>
-                <a:cs typeface="Times New Roman" panose="02020603050405020304" pitchFamily="18" charset="0"/>
-              </a:rPr>
-              <a:t>without parents</a:t>
-            </a:r>
-          </a:p>
-        </p:txBody>
-      </p:sp>
-      <p:sp>
-        <p:nvSpPr>
-          <p:cNvPr id="37" name="TextBox 36">
-            <a:extLst>
-              <a:ext uri="{FF2B5EF4-FFF2-40B4-BE49-F238E27FC236}">
-                <a16:creationId xmlns:a16="http://schemas.microsoft.com/office/drawing/2014/main" id="{5A6BBCDE-B6FA-0F42-9CF3-5ADE63029982}"/>
-              </a:ext>
-            </a:extLst>
-          </p:cNvPr>
-          <p:cNvSpPr txBox="1"/>
-          <p:nvPr/>
-        </p:nvSpPr>
-        <p:spPr>
-          <a:xfrm>
-            <a:off x="6883949" y="1195718"/>
-            <a:ext cx="250320" cy="149249"/>
-          </a:xfrm>
-          <a:prstGeom prst="rect">
-            <a:avLst/>
-          </a:prstGeom>
-          <a:noFill/>
-          <a:ln w="25400">
-            <a:solidFill>
+            </a:fontRef>
+          </p:style>
+        </p:cxnSp>
+        <p:cxnSp>
+          <p:nvCxnSpPr>
+            <p:cNvPr id="42" name="Straight Connector 41">
+              <a:extLst>
+                <a:ext uri="{FF2B5EF4-FFF2-40B4-BE49-F238E27FC236}">
+                  <a16:creationId xmlns:a16="http://schemas.microsoft.com/office/drawing/2014/main" id="{BF517051-C729-C548-8BFB-32E044A52E72}"/>
+                </a:ext>
+              </a:extLst>
+            </p:cNvPr>
+            <p:cNvCxnSpPr>
+              <a:cxnSpLocks/>
+            </p:cNvCxnSpPr>
+            <p:nvPr/>
+          </p:nvCxnSpPr>
+          <p:spPr>
+            <a:xfrm flipH="1" flipV="1">
+              <a:off x="6977279" y="1491705"/>
+              <a:ext cx="67976" cy="64446"/>
+            </a:xfrm>
+            <a:prstGeom prst="line">
+              <a:avLst/>
+            </a:prstGeom>
+            <a:ln w="25400">
+              <a:solidFill>
+                <a:schemeClr val="tx1"/>
+              </a:solidFill>
+            </a:ln>
+          </p:spPr>
+          <p:style>
+            <a:lnRef idx="1">
+              <a:schemeClr val="accent1"/>
+            </a:lnRef>
+            <a:fillRef idx="0">
+              <a:schemeClr val="accent1"/>
+            </a:fillRef>
+            <a:effectRef idx="0">
+              <a:schemeClr val="accent1"/>
+            </a:effectRef>
+            <a:fontRef idx="minor">
               <a:schemeClr val="tx1"/>
-            </a:solidFill>
-          </a:ln>
-        </p:spPr>
-        <p:txBody>
-          <a:bodyPr wrap="square" rtlCol="0">
-            <a:spAutoFit/>
-          </a:bodyPr>
-          <a:lstStyle/>
-          <a:p>
-            <a:pPr algn="ctr"/>
-            <a:endParaRPr lang="en-US" sz="1000" b="1" dirty="0">
-              <a:latin typeface="Times New Roman" panose="02020603050405020304" pitchFamily="18" charset="0"/>
-              <a:cs typeface="Times New Roman" panose="02020603050405020304" pitchFamily="18" charset="0"/>
-            </a:endParaRPr>
-          </a:p>
-        </p:txBody>
-      </p:sp>
-      <p:sp>
-        <p:nvSpPr>
-          <p:cNvPr id="38" name="Rectangle 37">
-            <a:extLst>
-              <a:ext uri="{FF2B5EF4-FFF2-40B4-BE49-F238E27FC236}">
-                <a16:creationId xmlns:a16="http://schemas.microsoft.com/office/drawing/2014/main" id="{EF655070-1063-9A4C-829A-54C7E94B88A0}"/>
-              </a:ext>
-            </a:extLst>
-          </p:cNvPr>
-          <p:cNvSpPr/>
-          <p:nvPr/>
-        </p:nvSpPr>
-        <p:spPr>
-          <a:xfrm>
-            <a:off x="3281355" y="1158475"/>
-            <a:ext cx="1454245" cy="246221"/>
-          </a:xfrm>
-          <a:prstGeom prst="rect">
-            <a:avLst/>
-          </a:prstGeom>
-        </p:spPr>
-        <p:txBody>
-          <a:bodyPr wrap="square">
-            <a:spAutoFit/>
-          </a:bodyPr>
-          <a:lstStyle/>
-          <a:p>
-            <a:pPr algn="ctr"/>
-            <a:r>
-              <a:rPr lang="en-US" sz="1000" b="1" dirty="0">
-                <a:latin typeface="Times New Roman" panose="02020603050405020304" pitchFamily="18" charset="0"/>
-                <a:cs typeface="Times New Roman" panose="02020603050405020304" pitchFamily="18" charset="0"/>
-              </a:rPr>
-              <a:t>traditional relationship</a:t>
-            </a:r>
-          </a:p>
-        </p:txBody>
-      </p:sp>
-      <p:cxnSp>
-        <p:nvCxnSpPr>
-          <p:cNvPr id="39" name="Straight Connector 38">
-            <a:extLst>
-              <a:ext uri="{FF2B5EF4-FFF2-40B4-BE49-F238E27FC236}">
-                <a16:creationId xmlns:a16="http://schemas.microsoft.com/office/drawing/2014/main" id="{9B605256-F7B5-4B44-8C91-B72D4FA68DBD}"/>
-              </a:ext>
-            </a:extLst>
-          </p:cNvPr>
-          <p:cNvCxnSpPr>
-            <a:cxnSpLocks/>
-            <a:endCxn id="37" idx="2"/>
-          </p:cNvCxnSpPr>
-          <p:nvPr/>
-        </p:nvCxnSpPr>
-        <p:spPr>
-          <a:xfrm flipV="1">
-            <a:off x="7009109" y="1344967"/>
-            <a:ext cx="0" cy="181472"/>
-          </a:xfrm>
-          <a:prstGeom prst="line">
-            <a:avLst/>
-          </a:prstGeom>
-          <a:ln w="25400">
-            <a:solidFill>
+            </a:fontRef>
+          </p:style>
+        </p:cxnSp>
+        <p:cxnSp>
+          <p:nvCxnSpPr>
+            <p:cNvPr id="46" name="Straight Connector 45">
+              <a:extLst>
+                <a:ext uri="{FF2B5EF4-FFF2-40B4-BE49-F238E27FC236}">
+                  <a16:creationId xmlns:a16="http://schemas.microsoft.com/office/drawing/2014/main" id="{EBB3E6A5-5767-6947-AC9C-B09A90E47670}"/>
+                </a:ext>
+              </a:extLst>
+            </p:cNvPr>
+            <p:cNvCxnSpPr>
+              <a:cxnSpLocks/>
+            </p:cNvCxnSpPr>
+            <p:nvPr/>
+          </p:nvCxnSpPr>
+          <p:spPr>
+            <a:xfrm flipV="1">
+              <a:off x="6977279" y="1491705"/>
+              <a:ext cx="67976" cy="64446"/>
+            </a:xfrm>
+            <a:prstGeom prst="line">
+              <a:avLst/>
+            </a:prstGeom>
+            <a:ln w="25400">
+              <a:solidFill>
+                <a:schemeClr val="tx1"/>
+              </a:solidFill>
+            </a:ln>
+          </p:spPr>
+          <p:style>
+            <a:lnRef idx="1">
+              <a:schemeClr val="accent1"/>
+            </a:lnRef>
+            <a:fillRef idx="0">
+              <a:schemeClr val="accent1"/>
+            </a:fillRef>
+            <a:effectRef idx="0">
+              <a:schemeClr val="accent1"/>
+            </a:effectRef>
+            <a:fontRef idx="minor">
               <a:schemeClr val="tx1"/>
-            </a:solidFill>
-          </a:ln>
-        </p:spPr>
-        <p:style>
-          <a:lnRef idx="1">
-            <a:schemeClr val="accent1"/>
-          </a:lnRef>
-          <a:fillRef idx="0">
-            <a:schemeClr val="accent1"/>
-          </a:fillRef>
-          <a:effectRef idx="0">
-            <a:schemeClr val="accent1"/>
-          </a:effectRef>
-          <a:fontRef idx="minor">
-            <a:schemeClr val="tx1"/>
-          </a:fontRef>
-        </p:style>
-      </p:cxnSp>
-      <p:cxnSp>
-        <p:nvCxnSpPr>
-          <p:cNvPr id="42" name="Straight Connector 41">
-            <a:extLst>
-              <a:ext uri="{FF2B5EF4-FFF2-40B4-BE49-F238E27FC236}">
-                <a16:creationId xmlns:a16="http://schemas.microsoft.com/office/drawing/2014/main" id="{BF517051-C729-C548-8BFB-32E044A52E72}"/>
-              </a:ext>
-            </a:extLst>
-          </p:cNvPr>
-          <p:cNvCxnSpPr>
-            <a:cxnSpLocks/>
-          </p:cNvCxnSpPr>
-          <p:nvPr/>
-        </p:nvCxnSpPr>
-        <p:spPr>
-          <a:xfrm flipH="1" flipV="1">
-            <a:off x="6977279" y="1491705"/>
-            <a:ext cx="67976" cy="64446"/>
-          </a:xfrm>
-          <a:prstGeom prst="line">
-            <a:avLst/>
-          </a:prstGeom>
-          <a:ln w="25400">
-            <a:solidFill>
-              <a:schemeClr val="tx1"/>
-            </a:solidFill>
-          </a:ln>
-        </p:spPr>
-        <p:style>
-          <a:lnRef idx="1">
-            <a:schemeClr val="accent1"/>
-          </a:lnRef>
-          <a:fillRef idx="0">
-            <a:schemeClr val="accent1"/>
-          </a:fillRef>
-          <a:effectRef idx="0">
-            <a:schemeClr val="accent1"/>
-          </a:effectRef>
-          <a:fontRef idx="minor">
-            <a:schemeClr val="tx1"/>
-          </a:fontRef>
-        </p:style>
-      </p:cxnSp>
-      <p:cxnSp>
-        <p:nvCxnSpPr>
-          <p:cNvPr id="46" name="Straight Connector 45">
-            <a:extLst>
-              <a:ext uri="{FF2B5EF4-FFF2-40B4-BE49-F238E27FC236}">
-                <a16:creationId xmlns:a16="http://schemas.microsoft.com/office/drawing/2014/main" id="{EBB3E6A5-5767-6947-AC9C-B09A90E47670}"/>
-              </a:ext>
-            </a:extLst>
-          </p:cNvPr>
-          <p:cNvCxnSpPr>
-            <a:cxnSpLocks/>
-          </p:cNvCxnSpPr>
-          <p:nvPr/>
-        </p:nvCxnSpPr>
-        <p:spPr>
-          <a:xfrm flipV="1">
-            <a:off x="6977279" y="1491705"/>
-            <a:ext cx="67976" cy="64446"/>
-          </a:xfrm>
-          <a:prstGeom prst="line">
-            <a:avLst/>
-          </a:prstGeom>
-          <a:ln w="25400">
-            <a:solidFill>
-              <a:schemeClr val="tx1"/>
-            </a:solidFill>
-          </a:ln>
-        </p:spPr>
-        <p:style>
-          <a:lnRef idx="1">
-            <a:schemeClr val="accent1"/>
-          </a:lnRef>
-          <a:fillRef idx="0">
-            <a:schemeClr val="accent1"/>
-          </a:fillRef>
-          <a:effectRef idx="0">
-            <a:schemeClr val="accent1"/>
-          </a:effectRef>
-          <a:fontRef idx="minor">
-            <a:schemeClr val="tx1"/>
-          </a:fontRef>
-        </p:style>
-      </p:cxnSp>
-      <p:sp>
-        <p:nvSpPr>
-          <p:cNvPr id="52" name="Rectangle 51">
-            <a:extLst>
-              <a:ext uri="{FF2B5EF4-FFF2-40B4-BE49-F238E27FC236}">
-                <a16:creationId xmlns:a16="http://schemas.microsoft.com/office/drawing/2014/main" id="{CFDEB0A4-D931-A64F-8A35-D7DCCCC25A5C}"/>
-              </a:ext>
-            </a:extLst>
-          </p:cNvPr>
-          <p:cNvSpPr/>
-          <p:nvPr/>
-        </p:nvSpPr>
-        <p:spPr>
-          <a:xfrm>
-            <a:off x="6600312" y="1585863"/>
-            <a:ext cx="862506" cy="338554"/>
-          </a:xfrm>
-          <a:prstGeom prst="rect">
-            <a:avLst/>
-          </a:prstGeom>
-        </p:spPr>
-        <p:txBody>
-          <a:bodyPr wrap="square">
-            <a:spAutoFit/>
-          </a:bodyPr>
-          <a:lstStyle/>
-          <a:p>
-            <a:pPr algn="ctr"/>
-            <a:r>
-              <a:rPr lang="en-US" sz="800" b="1" dirty="0">
-                <a:latin typeface="Times New Roman" panose="02020603050405020304" pitchFamily="18" charset="0"/>
-                <a:cs typeface="Times New Roman" panose="02020603050405020304" pitchFamily="18" charset="0"/>
-              </a:rPr>
-              <a:t>Dies without children</a:t>
-            </a:r>
-          </a:p>
-        </p:txBody>
-      </p:sp>
-      <p:pic>
-        <p:nvPicPr>
-          <p:cNvPr id="63" name="Picture 62">
-            <a:extLst>
-              <a:ext uri="{FF2B5EF4-FFF2-40B4-BE49-F238E27FC236}">
-                <a16:creationId xmlns:a16="http://schemas.microsoft.com/office/drawing/2014/main" id="{7C9272AE-E480-4B4D-BC6F-FD64B11ED718}"/>
-              </a:ext>
-            </a:extLst>
-          </p:cNvPr>
-          <p:cNvPicPr>
-            <a:picLocks noChangeAspect="1"/>
-          </p:cNvPicPr>
-          <p:nvPr/>
-        </p:nvPicPr>
-        <p:blipFill>
-          <a:blip r:embed="rId3"/>
-          <a:stretch>
-            <a:fillRect/>
-          </a:stretch>
-        </p:blipFill>
-        <p:spPr>
-          <a:xfrm>
-            <a:off x="6838047" y="1958105"/>
-            <a:ext cx="414416" cy="414416"/>
-          </a:xfrm>
-          <a:prstGeom prst="rect">
-            <a:avLst/>
-          </a:prstGeom>
-        </p:spPr>
-      </p:pic>
-      <p:pic>
-        <p:nvPicPr>
-          <p:cNvPr id="67" name="Picture 66">
-            <a:extLst>
-              <a:ext uri="{FF2B5EF4-FFF2-40B4-BE49-F238E27FC236}">
-                <a16:creationId xmlns:a16="http://schemas.microsoft.com/office/drawing/2014/main" id="{FAFD267A-8E50-174D-87AF-5D7217DF5D68}"/>
-              </a:ext>
-            </a:extLst>
-          </p:cNvPr>
-          <p:cNvPicPr>
-            <a:picLocks noChangeAspect="1"/>
-          </p:cNvPicPr>
-          <p:nvPr/>
-        </p:nvPicPr>
-        <p:blipFill>
-          <a:blip r:embed="rId4"/>
-          <a:stretch>
-            <a:fillRect/>
-          </a:stretch>
-        </p:blipFill>
-        <p:spPr>
-          <a:xfrm>
-            <a:off x="5229560" y="1137704"/>
-            <a:ext cx="529200" cy="529200"/>
-          </a:xfrm>
-          <a:prstGeom prst="rect">
-            <a:avLst/>
-          </a:prstGeom>
-        </p:spPr>
-      </p:pic>
-      <p:pic>
-        <p:nvPicPr>
-          <p:cNvPr id="68" name="Picture 67">
-            <a:extLst>
-              <a:ext uri="{FF2B5EF4-FFF2-40B4-BE49-F238E27FC236}">
-                <a16:creationId xmlns:a16="http://schemas.microsoft.com/office/drawing/2014/main" id="{991503AA-12A7-334D-A043-A41F82BAD9A2}"/>
-              </a:ext>
-            </a:extLst>
-          </p:cNvPr>
-          <p:cNvPicPr>
-            <a:picLocks noChangeAspect="1"/>
-          </p:cNvPicPr>
-          <p:nvPr/>
-        </p:nvPicPr>
-        <p:blipFill>
-          <a:blip r:embed="rId5"/>
-          <a:stretch>
-            <a:fillRect/>
-          </a:stretch>
-        </p:blipFill>
-        <p:spPr>
-          <a:xfrm>
-            <a:off x="6023847" y="1924416"/>
-            <a:ext cx="494153" cy="494153"/>
-          </a:xfrm>
-          <a:prstGeom prst="rect">
-            <a:avLst/>
-          </a:prstGeom>
-        </p:spPr>
-      </p:pic>
-      <p:sp>
-        <p:nvSpPr>
-          <p:cNvPr id="69" name="Rectangle 68">
-            <a:extLst>
-              <a:ext uri="{FF2B5EF4-FFF2-40B4-BE49-F238E27FC236}">
-                <a16:creationId xmlns:a16="http://schemas.microsoft.com/office/drawing/2014/main" id="{846DE241-E5E1-9443-B28D-7F95688B6460}"/>
-              </a:ext>
-            </a:extLst>
-          </p:cNvPr>
-          <p:cNvSpPr/>
-          <p:nvPr/>
-        </p:nvSpPr>
-        <p:spPr>
-          <a:xfrm>
-            <a:off x="6658020" y="2351805"/>
-            <a:ext cx="727124" cy="338554"/>
-          </a:xfrm>
-          <a:prstGeom prst="rect">
-            <a:avLst/>
-          </a:prstGeom>
-        </p:spPr>
-        <p:txBody>
-          <a:bodyPr wrap="square">
-            <a:spAutoFit/>
-          </a:bodyPr>
-          <a:lstStyle/>
-          <a:p>
-            <a:pPr algn="ctr"/>
-            <a:r>
-              <a:rPr lang="en-US" sz="800" b="1" dirty="0">
-                <a:latin typeface="Times New Roman" panose="02020603050405020304" pitchFamily="18" charset="0"/>
-                <a:cs typeface="Times New Roman" panose="02020603050405020304" pitchFamily="18" charset="0"/>
-              </a:rPr>
-              <a:t>Created by an agent</a:t>
-            </a:r>
-          </a:p>
-        </p:txBody>
-      </p:sp>
-      <p:sp>
-        <p:nvSpPr>
-          <p:cNvPr id="72" name="Rectangle 71">
-            <a:extLst>
-              <a:ext uri="{FF2B5EF4-FFF2-40B4-BE49-F238E27FC236}">
-                <a16:creationId xmlns:a16="http://schemas.microsoft.com/office/drawing/2014/main" id="{48464DB8-23EB-804B-9D34-4A64F80CC17B}"/>
-              </a:ext>
-            </a:extLst>
-          </p:cNvPr>
-          <p:cNvSpPr/>
-          <p:nvPr/>
-        </p:nvSpPr>
-        <p:spPr>
-          <a:xfrm>
-            <a:off x="3698966" y="1875963"/>
-            <a:ext cx="620683" cy="215444"/>
-          </a:xfrm>
-          <a:prstGeom prst="rect">
-            <a:avLst/>
-          </a:prstGeom>
-        </p:spPr>
-        <p:txBody>
-          <a:bodyPr wrap="none">
-            <a:spAutoFit/>
-          </a:bodyPr>
-          <a:lstStyle/>
-          <a:p>
-            <a:pPr algn="ctr"/>
-            <a:r>
-              <a:rPr lang="en-US" sz="800" dirty="0">
-                <a:latin typeface="Times New Roman" panose="02020603050405020304" pitchFamily="18" charset="0"/>
-                <a:cs typeface="Times New Roman" panose="02020603050405020304" pitchFamily="18" charset="0"/>
-              </a:rPr>
-              <a:t>(clickable)</a:t>
-            </a:r>
-          </a:p>
-        </p:txBody>
-      </p:sp>
-      <p:sp>
-        <p:nvSpPr>
-          <p:cNvPr id="73" name="Rectangle 72">
-            <a:extLst>
-              <a:ext uri="{FF2B5EF4-FFF2-40B4-BE49-F238E27FC236}">
-                <a16:creationId xmlns:a16="http://schemas.microsoft.com/office/drawing/2014/main" id="{8DB90419-7D9E-2D41-94E9-5E9FD76AEE45}"/>
-              </a:ext>
-            </a:extLst>
-          </p:cNvPr>
-          <p:cNvSpPr/>
-          <p:nvPr/>
-        </p:nvSpPr>
-        <p:spPr>
-          <a:xfrm>
-            <a:off x="3698966" y="2397525"/>
-            <a:ext cx="620683" cy="215444"/>
-          </a:xfrm>
-          <a:prstGeom prst="rect">
-            <a:avLst/>
-          </a:prstGeom>
-        </p:spPr>
-        <p:txBody>
-          <a:bodyPr wrap="none">
-            <a:spAutoFit/>
-          </a:bodyPr>
-          <a:lstStyle/>
-          <a:p>
-            <a:pPr algn="ctr"/>
-            <a:r>
-              <a:rPr lang="en-US" sz="800" dirty="0">
-                <a:latin typeface="Times New Roman" panose="02020603050405020304" pitchFamily="18" charset="0"/>
-                <a:cs typeface="Times New Roman" panose="02020603050405020304" pitchFamily="18" charset="0"/>
-              </a:rPr>
-              <a:t>(clickable)</a:t>
-            </a:r>
-          </a:p>
-        </p:txBody>
-      </p:sp>
-      <p:pic>
-        <p:nvPicPr>
-          <p:cNvPr id="4" name="Picture 3">
-            <a:extLst>
-              <a:ext uri="{FF2B5EF4-FFF2-40B4-BE49-F238E27FC236}">
-                <a16:creationId xmlns:a16="http://schemas.microsoft.com/office/drawing/2014/main" id="{DBDA7297-6435-EB46-B5FC-CA94184791B8}"/>
-              </a:ext>
-            </a:extLst>
-          </p:cNvPr>
-          <p:cNvPicPr>
-            <a:picLocks noChangeAspect="1"/>
-          </p:cNvPicPr>
-          <p:nvPr/>
-        </p:nvPicPr>
-        <p:blipFill>
-          <a:blip r:embed="rId6"/>
-          <a:stretch>
-            <a:fillRect/>
-          </a:stretch>
-        </p:blipFill>
-        <p:spPr>
-          <a:xfrm>
-            <a:off x="5344527" y="1993856"/>
-            <a:ext cx="239564" cy="378665"/>
-          </a:xfrm>
-          <a:prstGeom prst="rect">
-            <a:avLst/>
-          </a:prstGeom>
-        </p:spPr>
-      </p:pic>
+            </a:fontRef>
+          </p:style>
+        </p:cxnSp>
+        <p:sp>
+          <p:nvSpPr>
+            <p:cNvPr id="52" name="Rectangle 51">
+              <a:extLst>
+                <a:ext uri="{FF2B5EF4-FFF2-40B4-BE49-F238E27FC236}">
+                  <a16:creationId xmlns:a16="http://schemas.microsoft.com/office/drawing/2014/main" id="{CFDEB0A4-D931-A64F-8A35-D7DCCCC25A5C}"/>
+                </a:ext>
+              </a:extLst>
+            </p:cNvPr>
+            <p:cNvSpPr/>
+            <p:nvPr/>
+          </p:nvSpPr>
+          <p:spPr>
+            <a:xfrm>
+              <a:off x="6600312" y="1585863"/>
+              <a:ext cx="862506" cy="338554"/>
+            </a:xfrm>
+            <a:prstGeom prst="rect">
+              <a:avLst/>
+            </a:prstGeom>
+          </p:spPr>
+          <p:txBody>
+            <a:bodyPr wrap="square">
+              <a:spAutoFit/>
+            </a:bodyPr>
+            <a:lstStyle/>
+            <a:p>
+              <a:pPr algn="ctr"/>
+              <a:r>
+                <a:rPr lang="en-US" sz="800" b="1" dirty="0">
+                  <a:latin typeface="Times New Roman" panose="02020603050405020304" pitchFamily="18" charset="0"/>
+                  <a:cs typeface="Times New Roman" panose="02020603050405020304" pitchFamily="18" charset="0"/>
+                </a:rPr>
+                <a:t>Dies without children</a:t>
+              </a:r>
+            </a:p>
+          </p:txBody>
+        </p:sp>
+        <p:pic>
+          <p:nvPicPr>
+            <p:cNvPr id="63" name="Picture 62">
+              <a:extLst>
+                <a:ext uri="{FF2B5EF4-FFF2-40B4-BE49-F238E27FC236}">
+                  <a16:creationId xmlns:a16="http://schemas.microsoft.com/office/drawing/2014/main" id="{7C9272AE-E480-4B4D-BC6F-FD64B11ED718}"/>
+                </a:ext>
+              </a:extLst>
+            </p:cNvPr>
+            <p:cNvPicPr>
+              <a:picLocks noChangeAspect="1"/>
+            </p:cNvPicPr>
+            <p:nvPr/>
+          </p:nvPicPr>
+          <p:blipFill>
+            <a:blip r:embed="rId3"/>
+            <a:stretch>
+              <a:fillRect/>
+            </a:stretch>
+          </p:blipFill>
+          <p:spPr>
+            <a:xfrm>
+              <a:off x="6838047" y="1958105"/>
+              <a:ext cx="414416" cy="414416"/>
+            </a:xfrm>
+            <a:prstGeom prst="rect">
+              <a:avLst/>
+            </a:prstGeom>
+          </p:spPr>
+        </p:pic>
+        <p:pic>
+          <p:nvPicPr>
+            <p:cNvPr id="67" name="Picture 66">
+              <a:extLst>
+                <a:ext uri="{FF2B5EF4-FFF2-40B4-BE49-F238E27FC236}">
+                  <a16:creationId xmlns:a16="http://schemas.microsoft.com/office/drawing/2014/main" id="{FAFD267A-8E50-174D-87AF-5D7217DF5D68}"/>
+                </a:ext>
+              </a:extLst>
+            </p:cNvPr>
+            <p:cNvPicPr>
+              <a:picLocks noChangeAspect="1"/>
+            </p:cNvPicPr>
+            <p:nvPr/>
+          </p:nvPicPr>
+          <p:blipFill>
+            <a:blip r:embed="rId4"/>
+            <a:stretch>
+              <a:fillRect/>
+            </a:stretch>
+          </p:blipFill>
+          <p:spPr>
+            <a:xfrm>
+              <a:off x="5229560" y="1137704"/>
+              <a:ext cx="529200" cy="529200"/>
+            </a:xfrm>
+            <a:prstGeom prst="rect">
+              <a:avLst/>
+            </a:prstGeom>
+          </p:spPr>
+        </p:pic>
+        <p:pic>
+          <p:nvPicPr>
+            <p:cNvPr id="68" name="Picture 67">
+              <a:extLst>
+                <a:ext uri="{FF2B5EF4-FFF2-40B4-BE49-F238E27FC236}">
+                  <a16:creationId xmlns:a16="http://schemas.microsoft.com/office/drawing/2014/main" id="{991503AA-12A7-334D-A043-A41F82BAD9A2}"/>
+                </a:ext>
+              </a:extLst>
+            </p:cNvPr>
+            <p:cNvPicPr>
+              <a:picLocks noChangeAspect="1"/>
+            </p:cNvPicPr>
+            <p:nvPr/>
+          </p:nvPicPr>
+          <p:blipFill>
+            <a:blip r:embed="rId5"/>
+            <a:stretch>
+              <a:fillRect/>
+            </a:stretch>
+          </p:blipFill>
+          <p:spPr>
+            <a:xfrm>
+              <a:off x="6023847" y="1924416"/>
+              <a:ext cx="494153" cy="494153"/>
+            </a:xfrm>
+            <a:prstGeom prst="rect">
+              <a:avLst/>
+            </a:prstGeom>
+          </p:spPr>
+        </p:pic>
+        <p:sp>
+          <p:nvSpPr>
+            <p:cNvPr id="69" name="Rectangle 68">
+              <a:extLst>
+                <a:ext uri="{FF2B5EF4-FFF2-40B4-BE49-F238E27FC236}">
+                  <a16:creationId xmlns:a16="http://schemas.microsoft.com/office/drawing/2014/main" id="{846DE241-E5E1-9443-B28D-7F95688B6460}"/>
+                </a:ext>
+              </a:extLst>
+            </p:cNvPr>
+            <p:cNvSpPr/>
+            <p:nvPr/>
+          </p:nvSpPr>
+          <p:spPr>
+            <a:xfrm>
+              <a:off x="6658020" y="2351805"/>
+              <a:ext cx="727124" cy="338554"/>
+            </a:xfrm>
+            <a:prstGeom prst="rect">
+              <a:avLst/>
+            </a:prstGeom>
+          </p:spPr>
+          <p:txBody>
+            <a:bodyPr wrap="square">
+              <a:spAutoFit/>
+            </a:bodyPr>
+            <a:lstStyle/>
+            <a:p>
+              <a:pPr algn="ctr"/>
+              <a:r>
+                <a:rPr lang="en-US" sz="800" b="1" dirty="0">
+                  <a:latin typeface="Times New Roman" panose="02020603050405020304" pitchFamily="18" charset="0"/>
+                  <a:cs typeface="Times New Roman" panose="02020603050405020304" pitchFamily="18" charset="0"/>
+                </a:rPr>
+                <a:t>Created by an agent</a:t>
+              </a:r>
+            </a:p>
+          </p:txBody>
+        </p:sp>
+        <p:sp>
+          <p:nvSpPr>
+            <p:cNvPr id="72" name="Rectangle 71">
+              <a:extLst>
+                <a:ext uri="{FF2B5EF4-FFF2-40B4-BE49-F238E27FC236}">
+                  <a16:creationId xmlns:a16="http://schemas.microsoft.com/office/drawing/2014/main" id="{48464DB8-23EB-804B-9D34-4A64F80CC17B}"/>
+                </a:ext>
+              </a:extLst>
+            </p:cNvPr>
+            <p:cNvSpPr/>
+            <p:nvPr/>
+          </p:nvSpPr>
+          <p:spPr>
+            <a:xfrm>
+              <a:off x="3698966" y="1875963"/>
+              <a:ext cx="620683" cy="215444"/>
+            </a:xfrm>
+            <a:prstGeom prst="rect">
+              <a:avLst/>
+            </a:prstGeom>
+          </p:spPr>
+          <p:txBody>
+            <a:bodyPr wrap="none">
+              <a:spAutoFit/>
+            </a:bodyPr>
+            <a:lstStyle/>
+            <a:p>
+              <a:pPr algn="ctr"/>
+              <a:r>
+                <a:rPr lang="en-US" sz="800" dirty="0">
+                  <a:latin typeface="Times New Roman" panose="02020603050405020304" pitchFamily="18" charset="0"/>
+                  <a:cs typeface="Times New Roman" panose="02020603050405020304" pitchFamily="18" charset="0"/>
+                </a:rPr>
+                <a:t>(clickable)</a:t>
+              </a:r>
+            </a:p>
+          </p:txBody>
+        </p:sp>
+        <p:sp>
+          <p:nvSpPr>
+            <p:cNvPr id="73" name="Rectangle 72">
+              <a:extLst>
+                <a:ext uri="{FF2B5EF4-FFF2-40B4-BE49-F238E27FC236}">
+                  <a16:creationId xmlns:a16="http://schemas.microsoft.com/office/drawing/2014/main" id="{8DB90419-7D9E-2D41-94E9-5E9FD76AEE45}"/>
+                </a:ext>
+              </a:extLst>
+            </p:cNvPr>
+            <p:cNvSpPr/>
+            <p:nvPr/>
+          </p:nvSpPr>
+          <p:spPr>
+            <a:xfrm>
+              <a:off x="3698966" y="2397525"/>
+              <a:ext cx="620683" cy="215444"/>
+            </a:xfrm>
+            <a:prstGeom prst="rect">
+              <a:avLst/>
+            </a:prstGeom>
+          </p:spPr>
+          <p:txBody>
+            <a:bodyPr wrap="none">
+              <a:spAutoFit/>
+            </a:bodyPr>
+            <a:lstStyle/>
+            <a:p>
+              <a:pPr algn="ctr"/>
+              <a:r>
+                <a:rPr lang="en-US" sz="800" dirty="0">
+                  <a:latin typeface="Times New Roman" panose="02020603050405020304" pitchFamily="18" charset="0"/>
+                  <a:cs typeface="Times New Roman" panose="02020603050405020304" pitchFamily="18" charset="0"/>
+                </a:rPr>
+                <a:t>(clickable)</a:t>
+              </a:r>
+            </a:p>
+          </p:txBody>
+        </p:sp>
+        <p:pic>
+          <p:nvPicPr>
+            <p:cNvPr id="4" name="Picture 3">
+              <a:extLst>
+                <a:ext uri="{FF2B5EF4-FFF2-40B4-BE49-F238E27FC236}">
+                  <a16:creationId xmlns:a16="http://schemas.microsoft.com/office/drawing/2014/main" id="{DBDA7297-6435-EB46-B5FC-CA94184791B8}"/>
+                </a:ext>
+              </a:extLst>
+            </p:cNvPr>
+            <p:cNvPicPr>
+              <a:picLocks noChangeAspect="1"/>
+            </p:cNvPicPr>
+            <p:nvPr/>
+          </p:nvPicPr>
+          <p:blipFill>
+            <a:blip r:embed="rId6"/>
+            <a:stretch>
+              <a:fillRect/>
+            </a:stretch>
+          </p:blipFill>
+          <p:spPr>
+            <a:xfrm>
+              <a:off x="5344527" y="1993856"/>
+              <a:ext cx="239564" cy="378665"/>
+            </a:xfrm>
+            <a:prstGeom prst="rect">
+              <a:avLst/>
+            </a:prstGeom>
+          </p:spPr>
+        </p:pic>
+      </p:grpSp>
     </p:spTree>
     <p:extLst>
       <p:ext uri="{BB962C8B-B14F-4D97-AF65-F5344CB8AC3E}">

</xml_diff>

<commit_message>
Don't know how to fix issue wth hover for incestuous relationships - do a rudimentary solution for now)
</commit_message>
<xml_diff>
--- a/docs/Legend.pptx
+++ b/docs/Legend.pptx
@@ -261,7 +261,7 @@
           <a:p>
             <a:fld id="{AEBBC854-4617-724D-BAB8-DA132ABFC00B}" type="datetimeFigureOut">
               <a:rPr lang="en-US" smtClean="0"/>
-              <a:t>5/20/20</a:t>
+              <a:t>5/26/20</a:t>
             </a:fld>
             <a:endParaRPr lang="en-US"/>
           </a:p>
@@ -461,7 +461,7 @@
           <a:p>
             <a:fld id="{AEBBC854-4617-724D-BAB8-DA132ABFC00B}" type="datetimeFigureOut">
               <a:rPr lang="en-US" smtClean="0"/>
-              <a:t>5/20/20</a:t>
+              <a:t>5/26/20</a:t>
             </a:fld>
             <a:endParaRPr lang="en-US"/>
           </a:p>
@@ -671,7 +671,7 @@
           <a:p>
             <a:fld id="{AEBBC854-4617-724D-BAB8-DA132ABFC00B}" type="datetimeFigureOut">
               <a:rPr lang="en-US" smtClean="0"/>
-              <a:t>5/20/20</a:t>
+              <a:t>5/26/20</a:t>
             </a:fld>
             <a:endParaRPr lang="en-US"/>
           </a:p>
@@ -871,7 +871,7 @@
           <a:p>
             <a:fld id="{AEBBC854-4617-724D-BAB8-DA132ABFC00B}" type="datetimeFigureOut">
               <a:rPr lang="en-US" smtClean="0"/>
-              <a:t>5/20/20</a:t>
+              <a:t>5/26/20</a:t>
             </a:fld>
             <a:endParaRPr lang="en-US"/>
           </a:p>
@@ -1147,7 +1147,7 @@
           <a:p>
             <a:fld id="{AEBBC854-4617-724D-BAB8-DA132ABFC00B}" type="datetimeFigureOut">
               <a:rPr lang="en-US" smtClean="0"/>
-              <a:t>5/20/20</a:t>
+              <a:t>5/26/20</a:t>
             </a:fld>
             <a:endParaRPr lang="en-US"/>
           </a:p>
@@ -1415,7 +1415,7 @@
           <a:p>
             <a:fld id="{AEBBC854-4617-724D-BAB8-DA132ABFC00B}" type="datetimeFigureOut">
               <a:rPr lang="en-US" smtClean="0"/>
-              <a:t>5/20/20</a:t>
+              <a:t>5/26/20</a:t>
             </a:fld>
             <a:endParaRPr lang="en-US"/>
           </a:p>
@@ -1830,7 +1830,7 @@
           <a:p>
             <a:fld id="{AEBBC854-4617-724D-BAB8-DA132ABFC00B}" type="datetimeFigureOut">
               <a:rPr lang="en-US" smtClean="0"/>
-              <a:t>5/20/20</a:t>
+              <a:t>5/26/20</a:t>
             </a:fld>
             <a:endParaRPr lang="en-US"/>
           </a:p>
@@ -1972,7 +1972,7 @@
           <a:p>
             <a:fld id="{AEBBC854-4617-724D-BAB8-DA132ABFC00B}" type="datetimeFigureOut">
               <a:rPr lang="en-US" smtClean="0"/>
-              <a:t>5/20/20</a:t>
+              <a:t>5/26/20</a:t>
             </a:fld>
             <a:endParaRPr lang="en-US"/>
           </a:p>
@@ -2085,7 +2085,7 @@
           <a:p>
             <a:fld id="{AEBBC854-4617-724D-BAB8-DA132ABFC00B}" type="datetimeFigureOut">
               <a:rPr lang="en-US" smtClean="0"/>
-              <a:t>5/20/20</a:t>
+              <a:t>5/26/20</a:t>
             </a:fld>
             <a:endParaRPr lang="en-US"/>
           </a:p>
@@ -2398,7 +2398,7 @@
           <a:p>
             <a:fld id="{AEBBC854-4617-724D-BAB8-DA132ABFC00B}" type="datetimeFigureOut">
               <a:rPr lang="en-US" smtClean="0"/>
-              <a:t>5/20/20</a:t>
+              <a:t>5/26/20</a:t>
             </a:fld>
             <a:endParaRPr lang="en-US"/>
           </a:p>
@@ -2687,7 +2687,7 @@
           <a:p>
             <a:fld id="{AEBBC854-4617-724D-BAB8-DA132ABFC00B}" type="datetimeFigureOut">
               <a:rPr lang="en-US" smtClean="0"/>
-              <a:t>5/20/20</a:t>
+              <a:t>5/26/20</a:t>
             </a:fld>
             <a:endParaRPr lang="en-US"/>
           </a:p>
@@ -2930,7 +2930,7 @@
           <a:p>
             <a:fld id="{AEBBC854-4617-724D-BAB8-DA132ABFC00B}" type="datetimeFigureOut">
               <a:rPr lang="en-US" smtClean="0"/>
-              <a:t>5/20/20</a:t>
+              <a:t>5/26/20</a:t>
             </a:fld>
             <a:endParaRPr lang="en-US"/>
           </a:p>
@@ -3359,10 +3359,10 @@
       </p:grpSpPr>
       <p:grpSp>
         <p:nvGrpSpPr>
-          <p:cNvPr id="8" name="Group 7">
-            <a:extLst>
-              <a:ext uri="{FF2B5EF4-FFF2-40B4-BE49-F238E27FC236}">
-                <a16:creationId xmlns:a16="http://schemas.microsoft.com/office/drawing/2014/main" id="{CC3CD8AE-7967-234A-8EE7-F0CF6A6B0716}"/>
+          <p:cNvPr id="16" name="Group 15">
+            <a:extLst>
+              <a:ext uri="{FF2B5EF4-FFF2-40B4-BE49-F238E27FC236}">
+                <a16:creationId xmlns:a16="http://schemas.microsoft.com/office/drawing/2014/main" id="{3C0F00FC-4AD7-E04E-9298-049580178F3B}"/>
               </a:ext>
             </a:extLst>
           </p:cNvPr>
@@ -3371,10 +3371,10 @@
         </p:nvGrpSpPr>
         <p:grpSpPr>
           <a:xfrm>
-            <a:off x="1937656" y="1137704"/>
-            <a:ext cx="5557508" cy="1552655"/>
-            <a:chOff x="1937656" y="1137704"/>
-            <a:chExt cx="5557508" cy="1552655"/>
+            <a:off x="1937656" y="1147039"/>
+            <a:ext cx="5891652" cy="2025984"/>
+            <a:chOff x="1937656" y="1147039"/>
+            <a:chExt cx="5891652" cy="2025984"/>
           </a:xfrm>
         </p:grpSpPr>
         <p:sp>
@@ -3576,7 +3576,7 @@
           </p:nvSpPr>
           <p:spPr>
             <a:xfrm>
-              <a:off x="5088017" y="1585863"/>
+              <a:off x="5245572" y="2028167"/>
               <a:ext cx="727123" cy="338554"/>
             </a:xfrm>
             <a:prstGeom prst="rect">
@@ -3776,7 +3776,7 @@
           </p:nvSpPr>
           <p:spPr>
             <a:xfrm>
-              <a:off x="4954468" y="2351805"/>
+              <a:off x="5112023" y="2794109"/>
               <a:ext cx="991281" cy="338554"/>
             </a:xfrm>
             <a:prstGeom prst="rect">
@@ -3822,7 +3822,7 @@
           </p:blipFill>
           <p:spPr>
             <a:xfrm>
-              <a:off x="6047217" y="1158475"/>
+              <a:off x="6204772" y="1600779"/>
               <a:ext cx="439200" cy="439200"/>
             </a:xfrm>
             <a:prstGeom prst="rect">
@@ -3844,7 +3844,7 @@
           </p:nvSpPr>
           <p:spPr>
             <a:xfrm>
-              <a:off x="5906871" y="1585863"/>
+              <a:off x="6064426" y="2028167"/>
               <a:ext cx="727123" cy="338554"/>
             </a:xfrm>
             <a:prstGeom prst="rect">
@@ -3882,7 +3882,7 @@
           </p:nvSpPr>
           <p:spPr>
             <a:xfrm>
-              <a:off x="5763413" y="2351805"/>
+              <a:off x="5920968" y="2794109"/>
               <a:ext cx="991281" cy="338554"/>
             </a:xfrm>
             <a:prstGeom prst="rect">
@@ -3930,7 +3930,7 @@
           </p:nvSpPr>
           <p:spPr>
             <a:xfrm>
-              <a:off x="6883949" y="1195718"/>
+              <a:off x="7041504" y="1638022"/>
               <a:ext cx="250320" cy="149249"/>
             </a:xfrm>
             <a:prstGeom prst="rect">
@@ -4012,7 +4012,7 @@
           </p:nvCxnSpPr>
           <p:spPr>
             <a:xfrm flipV="1">
-              <a:off x="7009109" y="1344967"/>
+              <a:off x="7166664" y="1787271"/>
               <a:ext cx="0" cy="181472"/>
             </a:xfrm>
             <a:prstGeom prst="line">
@@ -4055,7 +4055,7 @@
           </p:nvCxnSpPr>
           <p:spPr>
             <a:xfrm flipH="1" flipV="1">
-              <a:off x="6977279" y="1491705"/>
+              <a:off x="7134834" y="1934009"/>
               <a:ext cx="67976" cy="64446"/>
             </a:xfrm>
             <a:prstGeom prst="line">
@@ -4098,7 +4098,7 @@
           </p:nvCxnSpPr>
           <p:spPr>
             <a:xfrm flipV="1">
-              <a:off x="6977279" y="1491705"/>
+              <a:off x="7134834" y="1934009"/>
               <a:ext cx="67976" cy="64446"/>
             </a:xfrm>
             <a:prstGeom prst="line">
@@ -4139,7 +4139,7 @@
           </p:nvSpPr>
           <p:spPr>
             <a:xfrm>
-              <a:off x="6600312" y="1585863"/>
+              <a:off x="6757867" y="2028167"/>
               <a:ext cx="862506" cy="338554"/>
             </a:xfrm>
             <a:prstGeom prst="rect">
@@ -4185,7 +4185,7 @@
           </p:blipFill>
           <p:spPr>
             <a:xfrm>
-              <a:off x="6838047" y="1958105"/>
+              <a:off x="6995602" y="2400409"/>
               <a:ext cx="414416" cy="414416"/>
             </a:xfrm>
             <a:prstGeom prst="rect">
@@ -4215,7 +4215,7 @@
           </p:blipFill>
           <p:spPr>
             <a:xfrm>
-              <a:off x="5229560" y="1137704"/>
+              <a:off x="5387115" y="1580008"/>
               <a:ext cx="529200" cy="529200"/>
             </a:xfrm>
             <a:prstGeom prst="rect">
@@ -4245,7 +4245,7 @@
           </p:blipFill>
           <p:spPr>
             <a:xfrm>
-              <a:off x="6023847" y="1924416"/>
+              <a:off x="6181402" y="2366720"/>
               <a:ext cx="494153" cy="494153"/>
             </a:xfrm>
             <a:prstGeom prst="rect">
@@ -4267,7 +4267,7 @@
           </p:nvSpPr>
           <p:spPr>
             <a:xfrm>
-              <a:off x="6588602" y="2351805"/>
+              <a:off x="6746157" y="2794109"/>
               <a:ext cx="906562" cy="338554"/>
             </a:xfrm>
             <a:prstGeom prst="rect">
@@ -4389,7 +4389,7 @@
           </p:blipFill>
           <p:spPr>
             <a:xfrm>
-              <a:off x="5344527" y="1993856"/>
+              <a:off x="5502082" y="2436160"/>
               <a:ext cx="239564" cy="378665"/>
             </a:xfrm>
             <a:prstGeom prst="rect">
@@ -4397,6 +4397,263 @@
             </a:prstGeom>
           </p:spPr>
         </p:pic>
+        <p:sp>
+          <p:nvSpPr>
+            <p:cNvPr id="31" name="TextBox 30">
+              <a:extLst>
+                <a:ext uri="{FF2B5EF4-FFF2-40B4-BE49-F238E27FC236}">
+                  <a16:creationId xmlns:a16="http://schemas.microsoft.com/office/drawing/2014/main" id="{6E1F34DB-EF5B-D342-9518-3C080CE5C5B2}"/>
+                </a:ext>
+              </a:extLst>
+            </p:cNvPr>
+            <p:cNvSpPr txBox="1"/>
+            <p:nvPr/>
+          </p:nvSpPr>
+          <p:spPr>
+            <a:xfrm>
+              <a:off x="1944093" y="2711358"/>
+              <a:ext cx="991281" cy="461665"/>
+            </a:xfrm>
+            <a:prstGeom prst="rect">
+              <a:avLst/>
+            </a:prstGeom>
+            <a:noFill/>
+            <a:ln w="25400">
+              <a:solidFill>
+                <a:srgbClr val="3AB243"/>
+              </a:solidFill>
+            </a:ln>
+          </p:spPr>
+          <p:txBody>
+            <a:bodyPr wrap="square" rtlCol="0">
+              <a:spAutoFit/>
+            </a:bodyPr>
+            <a:lstStyle/>
+            <a:p>
+              <a:pPr algn="ctr"/>
+              <a:r>
+                <a:rPr lang="en-US" sz="800" b="1" dirty="0">
+                  <a:latin typeface="Times New Roman" panose="02020603050405020304" pitchFamily="18" charset="0"/>
+                  <a:cs typeface="Times New Roman" panose="02020603050405020304" pitchFamily="18" charset="0"/>
+                </a:rPr>
+                <a:t>Entity has an incestuous relationship</a:t>
+              </a:r>
+            </a:p>
+          </p:txBody>
+        </p:sp>
+        <p:cxnSp>
+          <p:nvCxnSpPr>
+            <p:cNvPr id="34" name="Straight Connector 33">
+              <a:extLst>
+                <a:ext uri="{FF2B5EF4-FFF2-40B4-BE49-F238E27FC236}">
+                  <a16:creationId xmlns:a16="http://schemas.microsoft.com/office/drawing/2014/main" id="{1E7A2EA5-2A2F-6440-838F-416823FF9081}"/>
+                </a:ext>
+              </a:extLst>
+            </p:cNvPr>
+            <p:cNvCxnSpPr>
+              <a:cxnSpLocks/>
+            </p:cNvCxnSpPr>
+            <p:nvPr/>
+          </p:nvCxnSpPr>
+          <p:spPr>
+            <a:xfrm>
+              <a:off x="3192550" y="2940615"/>
+              <a:ext cx="1625917" cy="0"/>
+            </a:xfrm>
+            <a:prstGeom prst="line">
+              <a:avLst/>
+            </a:prstGeom>
+            <a:ln w="25400">
+              <a:solidFill>
+                <a:srgbClr val="3AB243"/>
+              </a:solidFill>
+            </a:ln>
+          </p:spPr>
+          <p:style>
+            <a:lnRef idx="1">
+              <a:schemeClr val="accent1"/>
+            </a:lnRef>
+            <a:fillRef idx="0">
+              <a:schemeClr val="accent1"/>
+            </a:fillRef>
+            <a:effectRef idx="0">
+              <a:schemeClr val="accent1"/>
+            </a:effectRef>
+            <a:fontRef idx="minor">
+              <a:schemeClr val="tx1"/>
+            </a:fontRef>
+          </p:style>
+        </p:cxnSp>
+        <p:sp>
+          <p:nvSpPr>
+            <p:cNvPr id="35" name="Rectangle 34">
+              <a:extLst>
+                <a:ext uri="{FF2B5EF4-FFF2-40B4-BE49-F238E27FC236}">
+                  <a16:creationId xmlns:a16="http://schemas.microsoft.com/office/drawing/2014/main" id="{1C2B0E60-2705-2D44-9F53-9AB002C109A4}"/>
+                </a:ext>
+              </a:extLst>
+            </p:cNvPr>
+            <p:cNvSpPr/>
+            <p:nvPr/>
+          </p:nvSpPr>
+          <p:spPr>
+            <a:xfrm>
+              <a:off x="3281355" y="2689273"/>
+              <a:ext cx="1454245" cy="246221"/>
+            </a:xfrm>
+            <a:prstGeom prst="rect">
+              <a:avLst/>
+            </a:prstGeom>
+          </p:spPr>
+          <p:txBody>
+            <a:bodyPr wrap="square">
+              <a:spAutoFit/>
+            </a:bodyPr>
+            <a:lstStyle/>
+            <a:p>
+              <a:pPr algn="ctr"/>
+              <a:r>
+                <a:rPr lang="en-US" sz="1000" b="1" dirty="0">
+                  <a:latin typeface="Times New Roman" panose="02020603050405020304" pitchFamily="18" charset="0"/>
+                  <a:cs typeface="Times New Roman" panose="02020603050405020304" pitchFamily="18" charset="0"/>
+                </a:rPr>
+                <a:t>incestuous relationship</a:t>
+              </a:r>
+            </a:p>
+          </p:txBody>
+        </p:sp>
+        <p:sp>
+          <p:nvSpPr>
+            <p:cNvPr id="40" name="Rectangle 39">
+              <a:extLst>
+                <a:ext uri="{FF2B5EF4-FFF2-40B4-BE49-F238E27FC236}">
+                  <a16:creationId xmlns:a16="http://schemas.microsoft.com/office/drawing/2014/main" id="{E3D95E82-7F6F-A046-B25F-510CD26D3697}"/>
+                </a:ext>
+              </a:extLst>
+            </p:cNvPr>
+            <p:cNvSpPr/>
+            <p:nvPr/>
+          </p:nvSpPr>
+          <p:spPr>
+            <a:xfrm>
+              <a:off x="3705403" y="2921426"/>
+              <a:ext cx="620683" cy="215444"/>
+            </a:xfrm>
+            <a:prstGeom prst="rect">
+              <a:avLst/>
+            </a:prstGeom>
+          </p:spPr>
+          <p:txBody>
+            <a:bodyPr wrap="none">
+              <a:spAutoFit/>
+            </a:bodyPr>
+            <a:lstStyle/>
+            <a:p>
+              <a:pPr algn="ctr"/>
+              <a:r>
+                <a:rPr lang="en-US" sz="800" dirty="0">
+                  <a:latin typeface="Times New Roman" panose="02020603050405020304" pitchFamily="18" charset="0"/>
+                  <a:cs typeface="Times New Roman" panose="02020603050405020304" pitchFamily="18" charset="0"/>
+                </a:rPr>
+                <a:t>(clickable)</a:t>
+              </a:r>
+            </a:p>
+          </p:txBody>
+        </p:sp>
+        <p:cxnSp>
+          <p:nvCxnSpPr>
+            <p:cNvPr id="15" name="Straight Connector 14">
+              <a:extLst>
+                <a:ext uri="{FF2B5EF4-FFF2-40B4-BE49-F238E27FC236}">
+                  <a16:creationId xmlns:a16="http://schemas.microsoft.com/office/drawing/2014/main" id="{612CFC54-DF31-4F41-8B83-F43957836B4E}"/>
+                </a:ext>
+              </a:extLst>
+            </p:cNvPr>
+            <p:cNvCxnSpPr>
+              <a:cxnSpLocks/>
+            </p:cNvCxnSpPr>
+            <p:nvPr/>
+          </p:nvCxnSpPr>
+          <p:spPr>
+            <a:xfrm>
+              <a:off x="5061496" y="1285001"/>
+              <a:ext cx="0" cy="1804911"/>
+            </a:xfrm>
+            <a:prstGeom prst="line">
+              <a:avLst/>
+            </a:prstGeom>
+            <a:ln>
+              <a:solidFill>
+                <a:schemeClr val="tx1">
+                  <a:lumMod val="95000"/>
+                  <a:lumOff val="5000"/>
+                </a:schemeClr>
+              </a:solidFill>
+            </a:ln>
+          </p:spPr>
+          <p:style>
+            <a:lnRef idx="1">
+              <a:schemeClr val="accent1"/>
+            </a:lnRef>
+            <a:fillRef idx="0">
+              <a:schemeClr val="accent1"/>
+            </a:fillRef>
+            <a:effectRef idx="0">
+              <a:schemeClr val="accent1"/>
+            </a:effectRef>
+            <a:fontRef idx="minor">
+              <a:schemeClr val="tx1"/>
+            </a:fontRef>
+          </p:style>
+        </p:cxnSp>
+        <p:sp>
+          <p:nvSpPr>
+            <p:cNvPr id="41" name="Rectangle 40">
+              <a:extLst>
+                <a:ext uri="{FF2B5EF4-FFF2-40B4-BE49-F238E27FC236}">
+                  <a16:creationId xmlns:a16="http://schemas.microsoft.com/office/drawing/2014/main" id="{9D0802FD-D9B1-014D-ACED-C62E07C4C45D}"/>
+                </a:ext>
+              </a:extLst>
+            </p:cNvPr>
+            <p:cNvSpPr/>
+            <p:nvPr/>
+          </p:nvSpPr>
+          <p:spPr>
+            <a:xfrm>
+              <a:off x="4907272" y="1147039"/>
+              <a:ext cx="2922036" cy="400110"/>
+            </a:xfrm>
+            <a:prstGeom prst="rect">
+              <a:avLst/>
+            </a:prstGeom>
+          </p:spPr>
+          <p:txBody>
+            <a:bodyPr wrap="square">
+              <a:spAutoFit/>
+            </a:bodyPr>
+            <a:lstStyle/>
+            <a:p>
+              <a:pPr algn="ctr"/>
+              <a:r>
+                <a:rPr lang="en-US" sz="1000" b="1" dirty="0">
+                  <a:latin typeface="Times New Roman" panose="02020603050405020304" pitchFamily="18" charset="0"/>
+                  <a:cs typeface="Times New Roman" panose="02020603050405020304" pitchFamily="18" charset="0"/>
+                </a:rPr>
+                <a:t>Unusual relationships</a:t>
+              </a:r>
+            </a:p>
+            <a:p>
+              <a:pPr algn="ctr"/>
+              <a:r>
+                <a:rPr lang="en-US" sz="1000" b="1" dirty="0">
+                  <a:latin typeface="Times New Roman" panose="02020603050405020304" pitchFamily="18" charset="0"/>
+                  <a:cs typeface="Times New Roman" panose="02020603050405020304" pitchFamily="18" charset="0"/>
+                </a:rPr>
+                <a:t>icon meanings:</a:t>
+              </a:r>
+            </a:p>
+          </p:txBody>
+        </p:sp>
       </p:grpSp>
     </p:spTree>
     <p:extLst>

</xml_diff>